<commit_message>
provided the backdrop and the final versions of the poster
</commit_message>
<xml_diff>
--- a/Poster.pptx
+++ b/Poster.pptx
@@ -7,10 +7,12 @@
   <p:sldIdLst>
     <p:sldId id="256" r:id="rId2"/>
     <p:sldId id="257" r:id="rId3"/>
-    <p:sldId id="258" r:id="rId4"/>
-    <p:sldId id="262" r:id="rId5"/>
-    <p:sldId id="259" r:id="rId6"/>
-    <p:sldId id="260" r:id="rId7"/>
+    <p:sldId id="259" r:id="rId4"/>
+    <p:sldId id="260" r:id="rId5"/>
+    <p:sldId id="258" r:id="rId6"/>
+    <p:sldId id="263" r:id="rId7"/>
+    <p:sldId id="262" r:id="rId8"/>
+    <p:sldId id="264" r:id="rId9"/>
   </p:sldIdLst>
   <p:sldSz cx="6858000" cy="9144000" type="screen4x3"/>
   <p:notesSz cx="6858000" cy="9144000"/>
@@ -306,7 +308,7 @@
           <a:p>
             <a:fld id="{9047D3B1-8747-E945-8CF3-E4C9B3004B13}" type="datetimeFigureOut">
               <a:rPr lang="en-US" smtClean="0"/>
-              <a:t>11/28/2023</a:t>
+              <a:t>12/5/2023</a:t>
             </a:fld>
             <a:endParaRPr lang="en-US"/>
           </a:p>
@@ -474,7 +476,7 @@
           <a:p>
             <a:fld id="{9047D3B1-8747-E945-8CF3-E4C9B3004B13}" type="datetimeFigureOut">
               <a:rPr lang="en-US" smtClean="0"/>
-              <a:t>11/28/2023</a:t>
+              <a:t>12/5/2023</a:t>
             </a:fld>
             <a:endParaRPr lang="en-US"/>
           </a:p>
@@ -652,7 +654,7 @@
           <a:p>
             <a:fld id="{9047D3B1-8747-E945-8CF3-E4C9B3004B13}" type="datetimeFigureOut">
               <a:rPr lang="en-US" smtClean="0"/>
-              <a:t>11/28/2023</a:t>
+              <a:t>12/5/2023</a:t>
             </a:fld>
             <a:endParaRPr lang="en-US"/>
           </a:p>
@@ -820,7 +822,7 @@
           <a:p>
             <a:fld id="{9047D3B1-8747-E945-8CF3-E4C9B3004B13}" type="datetimeFigureOut">
               <a:rPr lang="en-US" smtClean="0"/>
-              <a:t>11/28/2023</a:t>
+              <a:t>12/5/2023</a:t>
             </a:fld>
             <a:endParaRPr lang="en-US"/>
           </a:p>
@@ -1063,7 +1065,7 @@
           <a:p>
             <a:fld id="{9047D3B1-8747-E945-8CF3-E4C9B3004B13}" type="datetimeFigureOut">
               <a:rPr lang="en-US" smtClean="0"/>
-              <a:t>11/28/2023</a:t>
+              <a:t>12/5/2023</a:t>
             </a:fld>
             <a:endParaRPr lang="en-US"/>
           </a:p>
@@ -1292,7 +1294,7 @@
           <a:p>
             <a:fld id="{9047D3B1-8747-E945-8CF3-E4C9B3004B13}" type="datetimeFigureOut">
               <a:rPr lang="en-US" smtClean="0"/>
-              <a:t>11/28/2023</a:t>
+              <a:t>12/5/2023</a:t>
             </a:fld>
             <a:endParaRPr lang="en-US"/>
           </a:p>
@@ -1656,7 +1658,7 @@
           <a:p>
             <a:fld id="{9047D3B1-8747-E945-8CF3-E4C9B3004B13}" type="datetimeFigureOut">
               <a:rPr lang="en-US" smtClean="0"/>
-              <a:t>11/28/2023</a:t>
+              <a:t>12/5/2023</a:t>
             </a:fld>
             <a:endParaRPr lang="en-US"/>
           </a:p>
@@ -1773,7 +1775,7 @@
           <a:p>
             <a:fld id="{9047D3B1-8747-E945-8CF3-E4C9B3004B13}" type="datetimeFigureOut">
               <a:rPr lang="en-US" smtClean="0"/>
-              <a:t>11/28/2023</a:t>
+              <a:t>12/5/2023</a:t>
             </a:fld>
             <a:endParaRPr lang="en-US"/>
           </a:p>
@@ -1868,7 +1870,7 @@
           <a:p>
             <a:fld id="{9047D3B1-8747-E945-8CF3-E4C9B3004B13}" type="datetimeFigureOut">
               <a:rPr lang="en-US" smtClean="0"/>
-              <a:t>11/28/2023</a:t>
+              <a:t>12/5/2023</a:t>
             </a:fld>
             <a:endParaRPr lang="en-US"/>
           </a:p>
@@ -2143,7 +2145,7 @@
           <a:p>
             <a:fld id="{9047D3B1-8747-E945-8CF3-E4C9B3004B13}" type="datetimeFigureOut">
               <a:rPr lang="en-US" smtClean="0"/>
-              <a:t>11/28/2023</a:t>
+              <a:t>12/5/2023</a:t>
             </a:fld>
             <a:endParaRPr lang="en-US"/>
           </a:p>
@@ -2398,7 +2400,7 @@
           <a:p>
             <a:fld id="{9047D3B1-8747-E945-8CF3-E4C9B3004B13}" type="datetimeFigureOut">
               <a:rPr lang="en-US" smtClean="0"/>
-              <a:t>11/28/2023</a:t>
+              <a:t>12/5/2023</a:t>
             </a:fld>
             <a:endParaRPr lang="en-US"/>
           </a:p>
@@ -2609,7 +2611,7 @@
           <a:p>
             <a:fld id="{9047D3B1-8747-E945-8CF3-E4C9B3004B13}" type="datetimeFigureOut">
               <a:rPr lang="en-US" smtClean="0"/>
-              <a:t>11/28/2023</a:t>
+              <a:t>12/5/2023</a:t>
             </a:fld>
             <a:endParaRPr lang="en-US"/>
           </a:p>
@@ -3388,6 +3390,1407 @@
   <p:cSld>
     <p:bg>
       <p:bgPr>
+        <a:gradFill>
+          <a:gsLst>
+            <a:gs pos="74000">
+              <a:srgbClr val="5B7FEF"/>
+            </a:gs>
+            <a:gs pos="78000">
+              <a:srgbClr val="FF0000"/>
+            </a:gs>
+            <a:gs pos="60000">
+              <a:srgbClr val="F2F2F2"/>
+            </a:gs>
+            <a:gs pos="0">
+              <a:srgbClr val="E9E8DF"/>
+            </a:gs>
+            <a:gs pos="100000">
+              <a:srgbClr val="00B050"/>
+            </a:gs>
+          </a:gsLst>
+          <a:lin ang="5400000" scaled="1"/>
+        </a:gradFill>
+        <a:effectLst/>
+      </p:bgPr>
+    </p:bg>
+    <p:spTree>
+      <p:nvGrpSpPr>
+        <p:cNvPr id="1" name=""/>
+        <p:cNvGrpSpPr/>
+        <p:nvPr/>
+      </p:nvGrpSpPr>
+      <p:grpSpPr>
+        <a:xfrm>
+          <a:off x="0" y="0"/>
+          <a:ext cx="0" cy="0"/>
+          <a:chOff x="0" y="0"/>
+          <a:chExt cx="0" cy="0"/>
+        </a:xfrm>
+      </p:grpSpPr>
+      <p:pic>
+        <p:nvPicPr>
+          <p:cNvPr id="5" name="Content Placeholder 4" descr="A tower with a flag on it&#10;&#10;Description automatically generated">
+            <a:extLst>
+              <a:ext uri="{FF2B5EF4-FFF2-40B4-BE49-F238E27FC236}">
+                <a16:creationId xmlns:a16="http://schemas.microsoft.com/office/drawing/2014/main" id="{7D220D76-6613-B21F-B51C-08DB1B8D47C6}"/>
+              </a:ext>
+            </a:extLst>
+          </p:cNvPr>
+          <p:cNvPicPr>
+            <a:picLocks noGrp="1" noChangeAspect="1"/>
+          </p:cNvPicPr>
+          <p:nvPr>
+            <p:ph idx="1"/>
+          </p:nvPr>
+        </p:nvPicPr>
+        <p:blipFill>
+          <a:blip r:embed="rId2"/>
+          <a:stretch>
+            <a:fillRect/>
+          </a:stretch>
+        </p:blipFill>
+        <p:spPr>
+          <a:xfrm>
+            <a:off x="1332" y="836399"/>
+            <a:ext cx="6874565" cy="6874565"/>
+          </a:xfrm>
+        </p:spPr>
+      </p:pic>
+      <p:sp>
+        <p:nvSpPr>
+          <p:cNvPr id="14" name="Rounded Rectangle 13">
+            <a:extLst>
+              <a:ext uri="{FF2B5EF4-FFF2-40B4-BE49-F238E27FC236}">
+                <a16:creationId xmlns:a16="http://schemas.microsoft.com/office/drawing/2014/main" id="{86FD07DE-414A-07F2-83A8-4BF3BCF903FB}"/>
+              </a:ext>
+            </a:extLst>
+          </p:cNvPr>
+          <p:cNvSpPr/>
+          <p:nvPr/>
+        </p:nvSpPr>
+        <p:spPr>
+          <a:xfrm>
+            <a:off x="3428509" y="2645025"/>
+            <a:ext cx="3431759" cy="470928"/>
+          </a:xfrm>
+          <a:prstGeom prst="roundRect">
+            <a:avLst>
+              <a:gd name="adj" fmla="val 0"/>
+            </a:avLst>
+          </a:prstGeom>
+          <a:solidFill>
+            <a:srgbClr val="354114">
+              <a:alpha val="80000"/>
+            </a:srgbClr>
+          </a:solidFill>
+          <a:ln>
+            <a:noFill/>
+          </a:ln>
+        </p:spPr>
+        <p:style>
+          <a:lnRef idx="2">
+            <a:schemeClr val="accent1">
+              <a:shade val="15000"/>
+            </a:schemeClr>
+          </a:lnRef>
+          <a:fillRef idx="1">
+            <a:schemeClr val="accent1"/>
+          </a:fillRef>
+          <a:effectRef idx="0">
+            <a:schemeClr val="accent1"/>
+          </a:effectRef>
+          <a:fontRef idx="minor">
+            <a:schemeClr val="lt1"/>
+          </a:fontRef>
+        </p:style>
+        <p:txBody>
+          <a:bodyPr rtlCol="0" anchor="ctr"/>
+          <a:lstStyle/>
+          <a:p>
+            <a:r>
+              <a:rPr lang="en-US" sz="2400" dirty="0">
+                <a:solidFill>
+                  <a:schemeClr val="bg1"/>
+                </a:solidFill>
+              </a:rPr>
+              <a:t>Saturday, 16 Dec, 2023</a:t>
+            </a:r>
+          </a:p>
+        </p:txBody>
+      </p:sp>
+      <p:sp>
+        <p:nvSpPr>
+          <p:cNvPr id="17" name="Rounded Rectangle 16">
+            <a:extLst>
+              <a:ext uri="{FF2B5EF4-FFF2-40B4-BE49-F238E27FC236}">
+                <a16:creationId xmlns:a16="http://schemas.microsoft.com/office/drawing/2014/main" id="{0DFCFE03-233C-0B49-25EB-B63F9889916B}"/>
+              </a:ext>
+            </a:extLst>
+          </p:cNvPr>
+          <p:cNvSpPr/>
+          <p:nvPr/>
+        </p:nvSpPr>
+        <p:spPr>
+          <a:xfrm>
+            <a:off x="3428509" y="3201300"/>
+            <a:ext cx="3431759" cy="497712"/>
+          </a:xfrm>
+          <a:prstGeom prst="roundRect">
+            <a:avLst>
+              <a:gd name="adj" fmla="val 0"/>
+            </a:avLst>
+          </a:prstGeom>
+          <a:solidFill>
+            <a:srgbClr val="354114">
+              <a:alpha val="80000"/>
+            </a:srgbClr>
+          </a:solidFill>
+          <a:ln>
+            <a:noFill/>
+          </a:ln>
+        </p:spPr>
+        <p:style>
+          <a:lnRef idx="2">
+            <a:schemeClr val="accent1">
+              <a:shade val="15000"/>
+            </a:schemeClr>
+          </a:lnRef>
+          <a:fillRef idx="1">
+            <a:schemeClr val="accent1"/>
+          </a:fillRef>
+          <a:effectRef idx="0">
+            <a:schemeClr val="accent1"/>
+          </a:effectRef>
+          <a:fontRef idx="minor">
+            <a:schemeClr val="lt1"/>
+          </a:fontRef>
+        </p:style>
+        <p:txBody>
+          <a:bodyPr rtlCol="0" anchor="ctr"/>
+          <a:lstStyle/>
+          <a:p>
+            <a:r>
+              <a:rPr lang="en-US" sz="2400" dirty="0">
+                <a:solidFill>
+                  <a:schemeClr val="bg1"/>
+                </a:solidFill>
+              </a:rPr>
+              <a:t>5:30 PM</a:t>
+            </a:r>
+          </a:p>
+        </p:txBody>
+      </p:sp>
+      <p:sp>
+        <p:nvSpPr>
+          <p:cNvPr id="19" name="Rounded Rectangle 18">
+            <a:extLst>
+              <a:ext uri="{FF2B5EF4-FFF2-40B4-BE49-F238E27FC236}">
+                <a16:creationId xmlns:a16="http://schemas.microsoft.com/office/drawing/2014/main" id="{EBF53704-F530-652B-F89B-6FC726DCAE3B}"/>
+              </a:ext>
+            </a:extLst>
+          </p:cNvPr>
+          <p:cNvSpPr/>
+          <p:nvPr/>
+        </p:nvSpPr>
+        <p:spPr>
+          <a:xfrm>
+            <a:off x="3428509" y="1458839"/>
+            <a:ext cx="3431759" cy="1034674"/>
+          </a:xfrm>
+          <a:prstGeom prst="roundRect">
+            <a:avLst>
+              <a:gd name="adj" fmla="val 0"/>
+            </a:avLst>
+          </a:prstGeom>
+          <a:solidFill>
+            <a:srgbClr val="354114">
+              <a:alpha val="80000"/>
+            </a:srgbClr>
+          </a:solidFill>
+          <a:ln>
+            <a:noFill/>
+          </a:ln>
+        </p:spPr>
+        <p:style>
+          <a:lnRef idx="2">
+            <a:schemeClr val="accent1">
+              <a:shade val="15000"/>
+            </a:schemeClr>
+          </a:lnRef>
+          <a:fillRef idx="1">
+            <a:schemeClr val="accent1"/>
+          </a:fillRef>
+          <a:effectRef idx="0">
+            <a:schemeClr val="accent1"/>
+          </a:effectRef>
+          <a:fontRef idx="minor">
+            <a:schemeClr val="lt1"/>
+          </a:fontRef>
+        </p:style>
+        <p:txBody>
+          <a:bodyPr rtlCol="0" anchor="ctr"/>
+          <a:lstStyle/>
+          <a:p>
+            <a:r>
+              <a:rPr lang="en-US" sz="2400" dirty="0"/>
+              <a:t>Mayfair United Church</a:t>
+            </a:r>
+          </a:p>
+          <a:p>
+            <a:r>
+              <a:rPr lang="en-US" sz="2400" dirty="0"/>
+              <a:t>902 33rd St W, </a:t>
+            </a:r>
+          </a:p>
+          <a:p>
+            <a:r>
+              <a:rPr lang="en-US" sz="2400" dirty="0"/>
+              <a:t>Saskatoon, SK S7L 0W6</a:t>
+            </a:r>
+            <a:endParaRPr lang="en-US" sz="2400" dirty="0">
+              <a:solidFill>
+                <a:schemeClr val="bg1"/>
+              </a:solidFill>
+            </a:endParaRPr>
+          </a:p>
+        </p:txBody>
+      </p:sp>
+      <p:pic>
+        <p:nvPicPr>
+          <p:cNvPr id="20" name="Picture 19" descr="A green and red letters on a black background&#10;&#10;Description automatically generated">
+            <a:extLst>
+              <a:ext uri="{FF2B5EF4-FFF2-40B4-BE49-F238E27FC236}">
+                <a16:creationId xmlns:a16="http://schemas.microsoft.com/office/drawing/2014/main" id="{2E970466-A6FA-1E5F-6EA0-5E479DF4CEA8}"/>
+              </a:ext>
+            </a:extLst>
+          </p:cNvPr>
+          <p:cNvPicPr>
+            <a:picLocks noChangeAspect="1"/>
+          </p:cNvPicPr>
+          <p:nvPr/>
+        </p:nvPicPr>
+        <p:blipFill>
+          <a:blip r:embed="rId3"/>
+          <a:stretch>
+            <a:fillRect/>
+          </a:stretch>
+        </p:blipFill>
+        <p:spPr>
+          <a:xfrm>
+            <a:off x="4067309" y="30020"/>
+            <a:ext cx="2572278" cy="1190870"/>
+          </a:xfrm>
+          <a:prstGeom prst="rect">
+            <a:avLst/>
+          </a:prstGeom>
+        </p:spPr>
+      </p:pic>
+      <p:pic>
+        <p:nvPicPr>
+          <p:cNvPr id="18" name="Picture 8" descr="Location - Free maps and location icons">
+            <a:extLst>
+              <a:ext uri="{FF2B5EF4-FFF2-40B4-BE49-F238E27FC236}">
+                <a16:creationId xmlns:a16="http://schemas.microsoft.com/office/drawing/2014/main" id="{8BC6FF62-E6D9-80F5-BB21-14FFCDEBF948}"/>
+              </a:ext>
+            </a:extLst>
+          </p:cNvPr>
+          <p:cNvPicPr>
+            <a:picLocks noChangeAspect="1" noChangeArrowheads="1"/>
+          </p:cNvPicPr>
+          <p:nvPr/>
+        </p:nvPicPr>
+        <p:blipFill>
+          <a:blip r:embed="rId4">
+            <a:extLst>
+              <a:ext uri="{28A0092B-C50C-407E-A947-70E740481C1C}">
+                <a14:useLocalDpi xmlns:a14="http://schemas.microsoft.com/office/drawing/2010/main" val="0"/>
+              </a:ext>
+            </a:extLst>
+          </a:blip>
+          <a:srcRect/>
+          <a:stretch>
+            <a:fillRect/>
+          </a:stretch>
+        </p:blipFill>
+        <p:spPr bwMode="auto">
+          <a:xfrm>
+            <a:off x="6221005" y="1659172"/>
+            <a:ext cx="619418" cy="619418"/>
+          </a:xfrm>
+          <a:prstGeom prst="rect">
+            <a:avLst/>
+          </a:prstGeom>
+          <a:noFill/>
+          <a:extLst>
+            <a:ext uri="{909E8E84-426E-40DD-AFC4-6F175D3DCCD1}">
+              <a14:hiddenFill xmlns:a14="http://schemas.microsoft.com/office/drawing/2010/main">
+                <a:solidFill>
+                  <a:srgbClr val="FFFFFF"/>
+                </a:solidFill>
+              </a14:hiddenFill>
+            </a:ext>
+          </a:extLst>
+        </p:spPr>
+      </p:pic>
+      <p:pic>
+        <p:nvPicPr>
+          <p:cNvPr id="15" name="Picture 2" descr="Calendar icon - Free download on Iconfinder">
+            <a:extLst>
+              <a:ext uri="{FF2B5EF4-FFF2-40B4-BE49-F238E27FC236}">
+                <a16:creationId xmlns:a16="http://schemas.microsoft.com/office/drawing/2014/main" id="{917B0C02-992F-1A04-E72B-CFAA56C9CF44}"/>
+              </a:ext>
+            </a:extLst>
+          </p:cNvPr>
+          <p:cNvPicPr>
+            <a:picLocks noChangeAspect="1" noChangeArrowheads="1"/>
+          </p:cNvPicPr>
+          <p:nvPr/>
+        </p:nvPicPr>
+        <p:blipFill>
+          <a:blip r:embed="rId5">
+            <a:extLst>
+              <a:ext uri="{28A0092B-C50C-407E-A947-70E740481C1C}">
+                <a14:useLocalDpi xmlns:a14="http://schemas.microsoft.com/office/drawing/2010/main" val="0"/>
+              </a:ext>
+            </a:extLst>
+          </a:blip>
+          <a:srcRect/>
+          <a:stretch>
+            <a:fillRect/>
+          </a:stretch>
+        </p:blipFill>
+        <p:spPr bwMode="auto">
+          <a:xfrm>
+            <a:off x="6348631" y="2656687"/>
+            <a:ext cx="473132" cy="473132"/>
+          </a:xfrm>
+          <a:prstGeom prst="rect">
+            <a:avLst/>
+          </a:prstGeom>
+          <a:noFill/>
+          <a:extLst>
+            <a:ext uri="{909E8E84-426E-40DD-AFC4-6F175D3DCCD1}">
+              <a14:hiddenFill xmlns:a14="http://schemas.microsoft.com/office/drawing/2010/main">
+                <a:solidFill>
+                  <a:srgbClr val="FFFFFF"/>
+                </a:solidFill>
+              </a14:hiddenFill>
+            </a:ext>
+          </a:extLst>
+        </p:spPr>
+      </p:pic>
+      <p:pic>
+        <p:nvPicPr>
+          <p:cNvPr id="16" name="Picture 2" descr="Time Clock icon sign design 9341969 PNG">
+            <a:extLst>
+              <a:ext uri="{FF2B5EF4-FFF2-40B4-BE49-F238E27FC236}">
+                <a16:creationId xmlns:a16="http://schemas.microsoft.com/office/drawing/2014/main" id="{21E9DA96-3CAD-0DE9-DB1E-BC5C11CF9A44}"/>
+              </a:ext>
+            </a:extLst>
+          </p:cNvPr>
+          <p:cNvPicPr>
+            <a:picLocks noChangeAspect="1" noChangeArrowheads="1"/>
+          </p:cNvPicPr>
+          <p:nvPr/>
+        </p:nvPicPr>
+        <p:blipFill>
+          <a:blip r:embed="rId6">
+            <a:extLst>
+              <a:ext uri="{28A0092B-C50C-407E-A947-70E740481C1C}">
+                <a14:useLocalDpi xmlns:a14="http://schemas.microsoft.com/office/drawing/2010/main" val="0"/>
+              </a:ext>
+            </a:extLst>
+          </a:blip>
+          <a:srcRect/>
+          <a:stretch>
+            <a:fillRect/>
+          </a:stretch>
+        </p:blipFill>
+        <p:spPr bwMode="auto">
+          <a:xfrm>
+            <a:off x="6348631" y="3236401"/>
+            <a:ext cx="381557" cy="389860"/>
+          </a:xfrm>
+          <a:prstGeom prst="rect">
+            <a:avLst/>
+          </a:prstGeom>
+          <a:noFill/>
+          <a:extLst>
+            <a:ext uri="{909E8E84-426E-40DD-AFC4-6F175D3DCCD1}">
+              <a14:hiddenFill xmlns:a14="http://schemas.microsoft.com/office/drawing/2010/main">
+                <a:solidFill>
+                  <a:srgbClr val="FFFFFF"/>
+                </a:solidFill>
+              </a14:hiddenFill>
+            </a:ext>
+          </a:extLst>
+        </p:spPr>
+      </p:pic>
+      <p:sp>
+        <p:nvSpPr>
+          <p:cNvPr id="6" name="Oval 5">
+            <a:extLst>
+              <a:ext uri="{FF2B5EF4-FFF2-40B4-BE49-F238E27FC236}">
+                <a16:creationId xmlns:a16="http://schemas.microsoft.com/office/drawing/2014/main" id="{035096B2-6749-383F-9F80-2A062717A727}"/>
+              </a:ext>
+            </a:extLst>
+          </p:cNvPr>
+          <p:cNvSpPr/>
+          <p:nvPr/>
+        </p:nvSpPr>
+        <p:spPr>
+          <a:xfrm>
+            <a:off x="-545365" y="-592925"/>
+            <a:ext cx="2982701" cy="2847534"/>
+          </a:xfrm>
+          <a:prstGeom prst="ellipse">
+            <a:avLst/>
+          </a:prstGeom>
+          <a:noFill/>
+          <a:ln>
+            <a:noFill/>
+          </a:ln>
+        </p:spPr>
+        <p:style>
+          <a:lnRef idx="2">
+            <a:schemeClr val="accent1">
+              <a:shade val="15000"/>
+            </a:schemeClr>
+          </a:lnRef>
+          <a:fillRef idx="1">
+            <a:schemeClr val="accent1"/>
+          </a:fillRef>
+          <a:effectRef idx="0">
+            <a:schemeClr val="accent1"/>
+          </a:effectRef>
+          <a:fontRef idx="minor">
+            <a:schemeClr val="lt1"/>
+          </a:fontRef>
+        </p:style>
+        <p:txBody>
+          <a:bodyPr rtlCol="0" anchor="ctr"/>
+          <a:lstStyle/>
+          <a:p>
+            <a:pPr algn="ctr"/>
+            <a:r>
+              <a:rPr lang="en-US" sz="12000" dirty="0">
+                <a:solidFill>
+                  <a:srgbClr val="FF0000"/>
+                </a:solidFill>
+                <a:latin typeface="Li Alinur Prottoyoee Unicode" panose="02000500000000000000" pitchFamily="2" charset="0"/>
+                <a:cs typeface="Li Alinur Prottoyoee Unicode" panose="02000500000000000000" pitchFamily="2" charset="0"/>
+              </a:rPr>
+              <a:t>১৬</a:t>
+            </a:r>
+          </a:p>
+        </p:txBody>
+      </p:sp>
+      <p:sp>
+        <p:nvSpPr>
+          <p:cNvPr id="7" name="Rectangle 6">
+            <a:extLst>
+              <a:ext uri="{FF2B5EF4-FFF2-40B4-BE49-F238E27FC236}">
+                <a16:creationId xmlns:a16="http://schemas.microsoft.com/office/drawing/2014/main" id="{69C40BCA-4D4A-D6F4-EAA8-901C45BC323D}"/>
+              </a:ext>
+            </a:extLst>
+          </p:cNvPr>
+          <p:cNvSpPr/>
+          <p:nvPr/>
+        </p:nvSpPr>
+        <p:spPr>
+          <a:xfrm rot="20226102">
+            <a:off x="228356" y="1079138"/>
+            <a:ext cx="2982701" cy="914400"/>
+          </a:xfrm>
+          <a:prstGeom prst="rect">
+            <a:avLst/>
+          </a:prstGeom>
+          <a:noFill/>
+          <a:ln>
+            <a:noFill/>
+          </a:ln>
+        </p:spPr>
+        <p:style>
+          <a:lnRef idx="2">
+            <a:schemeClr val="accent1">
+              <a:shade val="15000"/>
+            </a:schemeClr>
+          </a:lnRef>
+          <a:fillRef idx="1">
+            <a:schemeClr val="accent1"/>
+          </a:fillRef>
+          <a:effectRef idx="0">
+            <a:schemeClr val="accent1"/>
+          </a:effectRef>
+          <a:fontRef idx="minor">
+            <a:schemeClr val="lt1"/>
+          </a:fontRef>
+        </p:style>
+        <p:txBody>
+          <a:bodyPr rtlCol="0" anchor="ctr"/>
+          <a:lstStyle/>
+          <a:p>
+            <a:pPr algn="ctr"/>
+            <a:r>
+              <a:rPr lang="en-CA" sz="6000" b="1" dirty="0" err="1">
+                <a:solidFill>
+                  <a:srgbClr val="106A48"/>
+                </a:solidFill>
+                <a:latin typeface="Matura MT Script Capitals" panose="03020802060602070202" pitchFamily="66" charset="0"/>
+                <a:ea typeface="Meiryo" panose="020B0400000000000000" pitchFamily="34" charset="-128"/>
+                <a:cs typeface="Li Alinur Akorshon Unicode" panose="02000500000000000000" pitchFamily="2" charset="0"/>
+              </a:rPr>
+              <a:t>ডিসেম্বর</a:t>
+            </a:r>
+            <a:r>
+              <a:rPr lang="en-CA" sz="6000" dirty="0">
+                <a:solidFill>
+                  <a:srgbClr val="FF0000"/>
+                </a:solidFill>
+                <a:latin typeface="Matura MT Script Capitals" panose="03020802060602070202" pitchFamily="66" charset="0"/>
+                <a:ea typeface="Meiryo" panose="020B0400000000000000" pitchFamily="34" charset="-128"/>
+                <a:cs typeface="Li Alinur Akorshon Unicode" panose="02000500000000000000" pitchFamily="2" charset="0"/>
+              </a:rPr>
+              <a:t> </a:t>
+            </a:r>
+          </a:p>
+        </p:txBody>
+      </p:sp>
+      <p:sp>
+        <p:nvSpPr>
+          <p:cNvPr id="9" name="Rectangle 8">
+            <a:extLst>
+              <a:ext uri="{FF2B5EF4-FFF2-40B4-BE49-F238E27FC236}">
+                <a16:creationId xmlns:a16="http://schemas.microsoft.com/office/drawing/2014/main" id="{40E20550-AB8E-91DA-D4B8-41FBA834C3DE}"/>
+              </a:ext>
+            </a:extLst>
+          </p:cNvPr>
+          <p:cNvSpPr/>
+          <p:nvPr/>
+        </p:nvSpPr>
+        <p:spPr>
+          <a:xfrm rot="20318689">
+            <a:off x="-393656" y="2238441"/>
+            <a:ext cx="3964986" cy="1514188"/>
+          </a:xfrm>
+          <a:prstGeom prst="rect">
+            <a:avLst/>
+          </a:prstGeom>
+          <a:noFill/>
+          <a:ln>
+            <a:noFill/>
+          </a:ln>
+        </p:spPr>
+        <p:style>
+          <a:lnRef idx="2">
+            <a:schemeClr val="accent1">
+              <a:shade val="15000"/>
+            </a:schemeClr>
+          </a:lnRef>
+          <a:fillRef idx="1">
+            <a:schemeClr val="accent1"/>
+          </a:fillRef>
+          <a:effectRef idx="0">
+            <a:schemeClr val="accent1"/>
+          </a:effectRef>
+          <a:fontRef idx="minor">
+            <a:schemeClr val="lt1"/>
+          </a:fontRef>
+        </p:style>
+        <p:txBody>
+          <a:bodyPr rtlCol="0" anchor="ctr"/>
+          <a:lstStyle/>
+          <a:p>
+            <a:pPr algn="ctr"/>
+            <a:r>
+              <a:rPr lang="en-CA" sz="10000" dirty="0" err="1">
+                <a:solidFill>
+                  <a:schemeClr val="tx1"/>
+                </a:solidFill>
+                <a:latin typeface="Li Alinur Prottoyoee Unicode" panose="02000500000000000000" pitchFamily="2" charset="0"/>
+                <a:ea typeface="Meiryo" panose="020B0400000000000000" pitchFamily="34" charset="-128"/>
+                <a:cs typeface="Li Alinur Prottoyoee Unicode" panose="02000500000000000000" pitchFamily="2" charset="0"/>
+              </a:rPr>
+              <a:t>বিজয়</a:t>
+            </a:r>
+            <a:r>
+              <a:rPr lang="en-CA" sz="10000" dirty="0">
+                <a:solidFill>
+                  <a:schemeClr val="bg1"/>
+                </a:solidFill>
+                <a:latin typeface="Li Alinur Prottoyoee Unicode" panose="02000500000000000000" pitchFamily="2" charset="0"/>
+                <a:ea typeface="Meiryo" panose="020B0400000000000000" pitchFamily="34" charset="-128"/>
+                <a:cs typeface="Li Alinur Prottoyoee Unicode" panose="02000500000000000000" pitchFamily="2" charset="0"/>
+              </a:rPr>
+              <a:t> </a:t>
+            </a:r>
+          </a:p>
+        </p:txBody>
+      </p:sp>
+      <p:sp>
+        <p:nvSpPr>
+          <p:cNvPr id="10" name="Rectangle 9">
+            <a:extLst>
+              <a:ext uri="{FF2B5EF4-FFF2-40B4-BE49-F238E27FC236}">
+                <a16:creationId xmlns:a16="http://schemas.microsoft.com/office/drawing/2014/main" id="{268D3994-2FDC-0C28-FDBB-8FC5A9AF4E32}"/>
+              </a:ext>
+            </a:extLst>
+          </p:cNvPr>
+          <p:cNvSpPr/>
+          <p:nvPr/>
+        </p:nvSpPr>
+        <p:spPr>
+          <a:xfrm rot="20435980">
+            <a:off x="506398" y="3285951"/>
+            <a:ext cx="2982701" cy="914400"/>
+          </a:xfrm>
+          <a:prstGeom prst="rect">
+            <a:avLst/>
+          </a:prstGeom>
+          <a:noFill/>
+          <a:ln>
+            <a:noFill/>
+          </a:ln>
+        </p:spPr>
+        <p:style>
+          <a:lnRef idx="2">
+            <a:schemeClr val="accent1">
+              <a:shade val="15000"/>
+            </a:schemeClr>
+          </a:lnRef>
+          <a:fillRef idx="1">
+            <a:schemeClr val="accent1"/>
+          </a:fillRef>
+          <a:effectRef idx="0">
+            <a:schemeClr val="accent1"/>
+          </a:effectRef>
+          <a:fontRef idx="minor">
+            <a:schemeClr val="lt1"/>
+          </a:fontRef>
+        </p:style>
+        <p:txBody>
+          <a:bodyPr rtlCol="0" anchor="ctr"/>
+          <a:lstStyle/>
+          <a:p>
+            <a:pPr algn="ctr"/>
+            <a:r>
+              <a:rPr lang="en-CA" sz="6000" dirty="0" err="1">
+                <a:solidFill>
+                  <a:schemeClr val="bg1"/>
+                </a:solidFill>
+                <a:latin typeface="Matura MT Script Capitals" panose="03020802060602070202" pitchFamily="66" charset="0"/>
+                <a:ea typeface="Meiryo" panose="020B0400000000000000" pitchFamily="34" charset="-128"/>
+                <a:cs typeface="Li Alinur Akorshon Unicode" panose="02000500000000000000" pitchFamily="2" charset="0"/>
+              </a:rPr>
+              <a:t>দিবস</a:t>
+            </a:r>
+            <a:r>
+              <a:rPr lang="en-CA" sz="6000" dirty="0">
+                <a:solidFill>
+                  <a:schemeClr val="bg1"/>
+                </a:solidFill>
+                <a:latin typeface="Matura MT Script Capitals" panose="03020802060602070202" pitchFamily="66" charset="0"/>
+                <a:ea typeface="Meiryo" panose="020B0400000000000000" pitchFamily="34" charset="-128"/>
+                <a:cs typeface="Li Alinur Akorshon Unicode" panose="02000500000000000000" pitchFamily="2" charset="0"/>
+              </a:rPr>
+              <a:t> </a:t>
+            </a:r>
+          </a:p>
+        </p:txBody>
+      </p:sp>
+      <p:sp>
+        <p:nvSpPr>
+          <p:cNvPr id="8" name="Rectangle 7">
+            <a:extLst>
+              <a:ext uri="{FF2B5EF4-FFF2-40B4-BE49-F238E27FC236}">
+                <a16:creationId xmlns:a16="http://schemas.microsoft.com/office/drawing/2014/main" id="{0C8F9C0E-EAA6-9942-0867-CFF669E54979}"/>
+              </a:ext>
+            </a:extLst>
+          </p:cNvPr>
+          <p:cNvSpPr/>
+          <p:nvPr/>
+        </p:nvSpPr>
+        <p:spPr>
+          <a:xfrm rot="20511714">
+            <a:off x="395510" y="1752649"/>
+            <a:ext cx="2982701" cy="914400"/>
+          </a:xfrm>
+          <a:prstGeom prst="rect">
+            <a:avLst/>
+          </a:prstGeom>
+          <a:noFill/>
+          <a:ln>
+            <a:noFill/>
+          </a:ln>
+        </p:spPr>
+        <p:style>
+          <a:lnRef idx="2">
+            <a:schemeClr val="accent1">
+              <a:shade val="15000"/>
+            </a:schemeClr>
+          </a:lnRef>
+          <a:fillRef idx="1">
+            <a:schemeClr val="accent1"/>
+          </a:fillRef>
+          <a:effectRef idx="0">
+            <a:schemeClr val="accent1"/>
+          </a:effectRef>
+          <a:fontRef idx="minor">
+            <a:schemeClr val="lt1"/>
+          </a:fontRef>
+        </p:style>
+        <p:txBody>
+          <a:bodyPr rtlCol="0" anchor="ctr"/>
+          <a:lstStyle/>
+          <a:p>
+            <a:pPr algn="ctr"/>
+            <a:r>
+              <a:rPr lang="en-CA" sz="6000" dirty="0" err="1">
+                <a:solidFill>
+                  <a:schemeClr val="tx1"/>
+                </a:solidFill>
+                <a:latin typeface="Matura MT Script Capitals" panose="03020802060602070202" pitchFamily="66" charset="0"/>
+                <a:ea typeface="Meiryo" panose="020B0400000000000000" pitchFamily="34" charset="-128"/>
+                <a:cs typeface="Li Alinur Akorshon Unicode" panose="02000500000000000000" pitchFamily="2" charset="0"/>
+              </a:rPr>
+              <a:t>মহান</a:t>
+            </a:r>
+            <a:r>
+              <a:rPr lang="en-CA" sz="6000" dirty="0">
+                <a:solidFill>
+                  <a:schemeClr val="tx1"/>
+                </a:solidFill>
+                <a:latin typeface="Matura MT Script Capitals" panose="03020802060602070202" pitchFamily="66" charset="0"/>
+                <a:ea typeface="Meiryo" panose="020B0400000000000000" pitchFamily="34" charset="-128"/>
+                <a:cs typeface="Li Alinur Akorshon Unicode" panose="02000500000000000000" pitchFamily="2" charset="0"/>
+              </a:rPr>
+              <a:t> </a:t>
+            </a:r>
+          </a:p>
+        </p:txBody>
+      </p:sp>
+      <p:sp>
+        <p:nvSpPr>
+          <p:cNvPr id="11" name="TextBox 10">
+            <a:extLst>
+              <a:ext uri="{FF2B5EF4-FFF2-40B4-BE49-F238E27FC236}">
+                <a16:creationId xmlns:a16="http://schemas.microsoft.com/office/drawing/2014/main" id="{12E9AA2F-B848-E071-4F68-B11B54D0E64B}"/>
+              </a:ext>
+            </a:extLst>
+          </p:cNvPr>
+          <p:cNvSpPr txBox="1"/>
+          <p:nvPr/>
+        </p:nvSpPr>
+        <p:spPr>
+          <a:xfrm>
+            <a:off x="-64874" y="7670198"/>
+            <a:ext cx="6987743" cy="1477328"/>
+          </a:xfrm>
+          <a:prstGeom prst="rect">
+            <a:avLst/>
+          </a:prstGeom>
+          <a:solidFill>
+            <a:srgbClr val="106A48"/>
+          </a:solidFill>
+        </p:spPr>
+        <p:txBody>
+          <a:bodyPr wrap="square">
+            <a:spAutoFit/>
+          </a:bodyPr>
+          <a:lstStyle/>
+          <a:p>
+            <a:pPr algn="ctr"/>
+            <a:r>
+              <a:rPr lang="en-CA" b="1" i="0" dirty="0">
+                <a:solidFill>
+                  <a:schemeClr val="bg1"/>
+                </a:solidFill>
+                <a:effectLst/>
+                <a:latin typeface="arial" panose="020B0604020202020204" pitchFamily="34" charset="0"/>
+              </a:rPr>
+              <a:t>OUR SPONSORS</a:t>
+            </a:r>
+          </a:p>
+          <a:p>
+            <a:pPr algn="ctr"/>
+            <a:r>
+              <a:rPr lang="en-CA" b="0" i="0" dirty="0">
+                <a:solidFill>
+                  <a:schemeClr val="bg1"/>
+                </a:solidFill>
+                <a:effectLst/>
+                <a:latin typeface="arial" panose="020B0604020202020204" pitchFamily="34" charset="0"/>
+              </a:rPr>
+              <a:t>•</a:t>
+            </a:r>
+            <a:r>
+              <a:rPr lang="en-CA" dirty="0">
+                <a:solidFill>
+                  <a:schemeClr val="bg1"/>
+                </a:solidFill>
+              </a:rPr>
+              <a:t>Asif Khan </a:t>
+            </a:r>
+            <a:r>
+              <a:rPr lang="en-CA" b="0" i="0" dirty="0">
+                <a:solidFill>
+                  <a:schemeClr val="bg1"/>
+                </a:solidFill>
+                <a:effectLst/>
+                <a:latin typeface="arial" panose="020B0604020202020204" pitchFamily="34" charset="0"/>
+              </a:rPr>
+              <a:t>•</a:t>
+            </a:r>
+            <a:r>
+              <a:rPr lang="en-CA" dirty="0">
+                <a:solidFill>
+                  <a:schemeClr val="bg1"/>
+                </a:solidFill>
+              </a:rPr>
+              <a:t>Priyanka Nandi </a:t>
+            </a:r>
+            <a:r>
+              <a:rPr lang="en-CA" b="0" i="0" dirty="0">
+                <a:solidFill>
+                  <a:schemeClr val="bg1"/>
+                </a:solidFill>
+                <a:effectLst/>
+                <a:latin typeface="arial" panose="020B0604020202020204" pitchFamily="34" charset="0"/>
+              </a:rPr>
+              <a:t>•</a:t>
+            </a:r>
+            <a:r>
+              <a:rPr lang="en-CA" dirty="0">
+                <a:solidFill>
+                  <a:schemeClr val="bg1"/>
+                </a:solidFill>
+              </a:rPr>
+              <a:t>Feroza Financial </a:t>
+            </a:r>
+            <a:r>
+              <a:rPr lang="en-CA" b="0" i="0" dirty="0">
+                <a:solidFill>
+                  <a:schemeClr val="bg1"/>
+                </a:solidFill>
+                <a:effectLst/>
+                <a:latin typeface="arial" panose="020B0604020202020204" pitchFamily="34" charset="0"/>
+              </a:rPr>
+              <a:t>•</a:t>
+            </a:r>
+            <a:r>
+              <a:rPr lang="en-CA" dirty="0">
+                <a:solidFill>
+                  <a:schemeClr val="bg1"/>
+                </a:solidFill>
+              </a:rPr>
+              <a:t>Makkah Halal Grocery </a:t>
+            </a:r>
+          </a:p>
+          <a:p>
+            <a:pPr algn="ctr"/>
+            <a:r>
+              <a:rPr lang="en-CA" b="0" i="0" dirty="0">
+                <a:solidFill>
+                  <a:schemeClr val="bg1"/>
+                </a:solidFill>
+                <a:effectLst/>
+                <a:latin typeface="arial" panose="020B0604020202020204" pitchFamily="34" charset="0"/>
+              </a:rPr>
+              <a:t>•</a:t>
+            </a:r>
+            <a:r>
+              <a:rPr lang="en-CA" dirty="0">
+                <a:solidFill>
+                  <a:schemeClr val="bg1"/>
+                </a:solidFill>
+              </a:rPr>
+              <a:t>First Choice Supermarket &amp; Halal Meat</a:t>
+            </a:r>
+            <a:r>
+              <a:rPr lang="en-CA" b="0" i="0" dirty="0">
+                <a:solidFill>
+                  <a:schemeClr val="bg1"/>
+                </a:solidFill>
+                <a:effectLst/>
+                <a:latin typeface="arial" panose="020B0604020202020204" pitchFamily="34" charset="0"/>
+              </a:rPr>
+              <a:t> •</a:t>
+            </a:r>
+            <a:r>
+              <a:rPr lang="en-CA" dirty="0">
+                <a:solidFill>
+                  <a:schemeClr val="bg1"/>
+                </a:solidFill>
+              </a:rPr>
+              <a:t>S M Auto Sales Ltd. </a:t>
+            </a:r>
+          </a:p>
+          <a:p>
+            <a:pPr algn="ctr"/>
+            <a:r>
+              <a:rPr lang="en-CA" b="0" i="0" dirty="0">
+                <a:solidFill>
+                  <a:schemeClr val="bg1"/>
+                </a:solidFill>
+                <a:effectLst/>
+                <a:latin typeface="arial" panose="020B0604020202020204" pitchFamily="34" charset="0"/>
+              </a:rPr>
+              <a:t>•</a:t>
+            </a:r>
+            <a:r>
+              <a:rPr lang="en-CA" dirty="0">
+                <a:solidFill>
+                  <a:schemeClr val="bg1"/>
+                </a:solidFill>
+              </a:rPr>
+              <a:t>Guide Me Immigration </a:t>
+            </a:r>
+            <a:r>
+              <a:rPr lang="en-CA" b="0" i="0" dirty="0">
+                <a:solidFill>
+                  <a:schemeClr val="bg1"/>
+                </a:solidFill>
+                <a:effectLst/>
+                <a:latin typeface="arial" panose="020B0604020202020204" pitchFamily="34" charset="0"/>
+              </a:rPr>
+              <a:t>•</a:t>
+            </a:r>
+            <a:r>
+              <a:rPr lang="en-CA" dirty="0">
+                <a:solidFill>
+                  <a:schemeClr val="bg1"/>
+                </a:solidFill>
+              </a:rPr>
+              <a:t>Popular Auto </a:t>
+            </a:r>
+            <a:r>
+              <a:rPr lang="en-CA" b="0" i="0" dirty="0">
+                <a:solidFill>
+                  <a:schemeClr val="bg1"/>
+                </a:solidFill>
+                <a:effectLst/>
+                <a:latin typeface="arial" panose="020B0604020202020204" pitchFamily="34" charset="0"/>
+              </a:rPr>
+              <a:t>•</a:t>
+            </a:r>
+            <a:r>
+              <a:rPr lang="en-CA" dirty="0">
+                <a:solidFill>
+                  <a:schemeClr val="bg1"/>
+                </a:solidFill>
+              </a:rPr>
+              <a:t>Sky Motors </a:t>
+            </a:r>
+          </a:p>
+          <a:p>
+            <a:pPr algn="ctr"/>
+            <a:r>
+              <a:rPr lang="en-CA" b="0" i="0" dirty="0">
+                <a:solidFill>
+                  <a:schemeClr val="bg1"/>
+                </a:solidFill>
+                <a:effectLst/>
+                <a:latin typeface="arial" panose="020B0604020202020204" pitchFamily="34" charset="0"/>
+              </a:rPr>
+              <a:t>•</a:t>
+            </a:r>
+            <a:r>
+              <a:rPr lang="en-CA" dirty="0">
+                <a:solidFill>
+                  <a:schemeClr val="bg1"/>
+                </a:solidFill>
+              </a:rPr>
+              <a:t>Economy Auto Repair </a:t>
+            </a:r>
+            <a:r>
+              <a:rPr lang="en-CA" b="0" i="0" dirty="0">
+                <a:solidFill>
+                  <a:schemeClr val="bg1"/>
+                </a:solidFill>
+                <a:effectLst/>
+                <a:latin typeface="arial" panose="020B0604020202020204" pitchFamily="34" charset="0"/>
+              </a:rPr>
+              <a:t>•</a:t>
+            </a:r>
+            <a:r>
+              <a:rPr lang="en-CA" dirty="0">
+                <a:solidFill>
+                  <a:schemeClr val="bg1"/>
+                </a:solidFill>
+              </a:rPr>
+              <a:t>Nas-Motive Auto Sales &amp; Services</a:t>
+            </a:r>
+          </a:p>
+        </p:txBody>
+      </p:sp>
+      <p:sp>
+        <p:nvSpPr>
+          <p:cNvPr id="12" name="Rectangle 11">
+            <a:extLst>
+              <a:ext uri="{FF2B5EF4-FFF2-40B4-BE49-F238E27FC236}">
+                <a16:creationId xmlns:a16="http://schemas.microsoft.com/office/drawing/2014/main" id="{C65A9F8E-0AEA-FDFE-A45F-7B0FF32BE580}"/>
+              </a:ext>
+            </a:extLst>
+          </p:cNvPr>
+          <p:cNvSpPr/>
+          <p:nvPr/>
+        </p:nvSpPr>
+        <p:spPr>
+          <a:xfrm>
+            <a:off x="21549" y="4468076"/>
+            <a:ext cx="2982701" cy="914400"/>
+          </a:xfrm>
+          <a:prstGeom prst="rect">
+            <a:avLst/>
+          </a:prstGeom>
+          <a:solidFill>
+            <a:srgbClr val="FF0000"/>
+          </a:solidFill>
+          <a:ln>
+            <a:solidFill>
+              <a:srgbClr val="106A48"/>
+            </a:solidFill>
+          </a:ln>
+        </p:spPr>
+        <p:style>
+          <a:lnRef idx="2">
+            <a:schemeClr val="accent1">
+              <a:shade val="15000"/>
+            </a:schemeClr>
+          </a:lnRef>
+          <a:fillRef idx="1">
+            <a:schemeClr val="accent1"/>
+          </a:fillRef>
+          <a:effectRef idx="0">
+            <a:schemeClr val="accent1"/>
+          </a:effectRef>
+          <a:fontRef idx="minor">
+            <a:schemeClr val="lt1"/>
+          </a:fontRef>
+        </p:style>
+        <p:txBody>
+          <a:bodyPr rtlCol="0" anchor="ctr"/>
+          <a:lstStyle/>
+          <a:p>
+            <a:pPr algn="ctr"/>
+            <a:r>
+              <a:rPr lang="en-CA" sz="6000" dirty="0" err="1">
+                <a:solidFill>
+                  <a:schemeClr val="bg1"/>
+                </a:solidFill>
+                <a:latin typeface="Matura MT Script Capitals" panose="03020802060602070202" pitchFamily="66" charset="0"/>
+                <a:ea typeface="Meiryo" panose="020B0400000000000000" pitchFamily="34" charset="-128"/>
+                <a:cs typeface="Li Alinur Akorshon Unicode" panose="02000500000000000000" pitchFamily="2" charset="0"/>
+              </a:rPr>
+              <a:t>দিবস</a:t>
+            </a:r>
+            <a:r>
+              <a:rPr lang="en-CA" sz="6000" dirty="0">
+                <a:solidFill>
+                  <a:schemeClr val="bg1"/>
+                </a:solidFill>
+                <a:latin typeface="Matura MT Script Capitals" panose="03020802060602070202" pitchFamily="66" charset="0"/>
+                <a:ea typeface="Meiryo" panose="020B0400000000000000" pitchFamily="34" charset="-128"/>
+                <a:cs typeface="Li Alinur Akorshon Unicode" panose="02000500000000000000" pitchFamily="2" charset="0"/>
+              </a:rPr>
+              <a:t> </a:t>
+            </a:r>
+          </a:p>
+        </p:txBody>
+      </p:sp>
+    </p:spTree>
+    <p:extLst>
+      <p:ext uri="{BB962C8B-B14F-4D97-AF65-F5344CB8AC3E}">
+        <p14:creationId xmlns:p14="http://schemas.microsoft.com/office/powerpoint/2010/main" val="3651182416"/>
+      </p:ext>
+    </p:extLst>
+  </p:cSld>
+  <p:clrMapOvr>
+    <a:masterClrMapping/>
+  </p:clrMapOvr>
+</p:sld>
+</file>
+
+<file path=ppt/slides/slide4.xml><?xml version="1.0" encoding="utf-8"?>
+<p:sld xmlns:a="http://schemas.openxmlformats.org/drawingml/2006/main" xmlns:r="http://schemas.openxmlformats.org/officeDocument/2006/relationships" xmlns:p="http://schemas.openxmlformats.org/presentationml/2006/main">
+  <p:cSld>
+    <p:spTree>
+      <p:nvGrpSpPr>
+        <p:cNvPr id="1" name=""/>
+        <p:cNvGrpSpPr/>
+        <p:nvPr/>
+      </p:nvGrpSpPr>
+      <p:grpSpPr>
+        <a:xfrm>
+          <a:off x="0" y="0"/>
+          <a:ext cx="0" cy="0"/>
+          <a:chOff x="0" y="0"/>
+          <a:chExt cx="0" cy="0"/>
+        </a:xfrm>
+      </p:grpSpPr>
+      <p:pic>
+        <p:nvPicPr>
+          <p:cNvPr id="5122" name="Picture 2" descr="Calendar icon - Free download on Iconfinder">
+            <a:extLst>
+              <a:ext uri="{FF2B5EF4-FFF2-40B4-BE49-F238E27FC236}">
+                <a16:creationId xmlns:a16="http://schemas.microsoft.com/office/drawing/2014/main" id="{E18E59D5-D8E7-577B-5EB8-23E32B895FF0}"/>
+              </a:ext>
+            </a:extLst>
+          </p:cNvPr>
+          <p:cNvPicPr>
+            <a:picLocks noChangeAspect="1" noChangeArrowheads="1"/>
+          </p:cNvPicPr>
+          <p:nvPr/>
+        </p:nvPicPr>
+        <p:blipFill>
+          <a:blip r:embed="rId2">
+            <a:extLst>
+              <a:ext uri="{28A0092B-C50C-407E-A947-70E740481C1C}">
+                <a14:useLocalDpi xmlns:a14="http://schemas.microsoft.com/office/drawing/2010/main" val="0"/>
+              </a:ext>
+            </a:extLst>
+          </a:blip>
+          <a:srcRect/>
+          <a:stretch>
+            <a:fillRect/>
+          </a:stretch>
+        </p:blipFill>
+        <p:spPr bwMode="auto">
+          <a:xfrm>
+            <a:off x="251790" y="1076738"/>
+            <a:ext cx="1578113" cy="1578113"/>
+          </a:xfrm>
+          <a:prstGeom prst="rect">
+            <a:avLst/>
+          </a:prstGeom>
+          <a:noFill/>
+          <a:extLst>
+            <a:ext uri="{909E8E84-426E-40DD-AFC4-6F175D3DCCD1}">
+              <a14:hiddenFill xmlns:a14="http://schemas.microsoft.com/office/drawing/2010/main">
+                <a:solidFill>
+                  <a:srgbClr val="FFFFFF"/>
+                </a:solidFill>
+              </a14:hiddenFill>
+            </a:ext>
+          </a:extLst>
+        </p:spPr>
+      </p:pic>
+      <p:pic>
+        <p:nvPicPr>
+          <p:cNvPr id="4" name="Picture 2" descr="Time Clock icon sign design 9341969 PNG">
+            <a:extLst>
+              <a:ext uri="{FF2B5EF4-FFF2-40B4-BE49-F238E27FC236}">
+                <a16:creationId xmlns:a16="http://schemas.microsoft.com/office/drawing/2014/main" id="{18365E58-0600-1096-0546-69039E64D0D7}"/>
+              </a:ext>
+            </a:extLst>
+          </p:cNvPr>
+          <p:cNvPicPr>
+            <a:picLocks noChangeAspect="1" noChangeArrowheads="1"/>
+          </p:cNvPicPr>
+          <p:nvPr/>
+        </p:nvPicPr>
+        <p:blipFill>
+          <a:blip r:embed="rId3">
+            <a:extLst>
+              <a:ext uri="{28A0092B-C50C-407E-A947-70E740481C1C}">
+                <a14:useLocalDpi xmlns:a14="http://schemas.microsoft.com/office/drawing/2010/main" val="0"/>
+              </a:ext>
+            </a:extLst>
+          </a:blip>
+          <a:srcRect/>
+          <a:stretch>
+            <a:fillRect/>
+          </a:stretch>
+        </p:blipFill>
+        <p:spPr bwMode="auto">
+          <a:xfrm>
+            <a:off x="332408" y="2835964"/>
+            <a:ext cx="1854706" cy="1895062"/>
+          </a:xfrm>
+          <a:prstGeom prst="rect">
+            <a:avLst/>
+          </a:prstGeom>
+          <a:noFill/>
+          <a:extLst>
+            <a:ext uri="{909E8E84-426E-40DD-AFC4-6F175D3DCCD1}">
+              <a14:hiddenFill xmlns:a14="http://schemas.microsoft.com/office/drawing/2010/main">
+                <a:solidFill>
+                  <a:srgbClr val="FFFFFF"/>
+                </a:solidFill>
+              </a14:hiddenFill>
+            </a:ext>
+          </a:extLst>
+        </p:spPr>
+      </p:pic>
+      <p:pic>
+        <p:nvPicPr>
+          <p:cNvPr id="5" name="Picture 8" descr="Location - Free maps and location icons">
+            <a:extLst>
+              <a:ext uri="{FF2B5EF4-FFF2-40B4-BE49-F238E27FC236}">
+                <a16:creationId xmlns:a16="http://schemas.microsoft.com/office/drawing/2014/main" id="{BF89A4D8-ED95-2C11-CAA1-B4C8AF20FC77}"/>
+              </a:ext>
+            </a:extLst>
+          </p:cNvPr>
+          <p:cNvPicPr>
+            <a:picLocks noChangeAspect="1" noChangeArrowheads="1"/>
+          </p:cNvPicPr>
+          <p:nvPr/>
+        </p:nvPicPr>
+        <p:blipFill>
+          <a:blip r:embed="rId4">
+            <a:extLst>
+              <a:ext uri="{28A0092B-C50C-407E-A947-70E740481C1C}">
+                <a14:useLocalDpi xmlns:a14="http://schemas.microsoft.com/office/drawing/2010/main" val="0"/>
+              </a:ext>
+            </a:extLst>
+          </a:blip>
+          <a:srcRect/>
+          <a:stretch>
+            <a:fillRect/>
+          </a:stretch>
+        </p:blipFill>
+        <p:spPr bwMode="auto">
+          <a:xfrm>
+            <a:off x="1829903" y="5800037"/>
+            <a:ext cx="2267225" cy="2267225"/>
+          </a:xfrm>
+          <a:prstGeom prst="rect">
+            <a:avLst/>
+          </a:prstGeom>
+          <a:noFill/>
+          <a:extLst>
+            <a:ext uri="{909E8E84-426E-40DD-AFC4-6F175D3DCCD1}">
+              <a14:hiddenFill xmlns:a14="http://schemas.microsoft.com/office/drawing/2010/main">
+                <a:solidFill>
+                  <a:srgbClr val="FFFFFF"/>
+                </a:solidFill>
+              </a14:hiddenFill>
+            </a:ext>
+          </a:extLst>
+        </p:spPr>
+      </p:pic>
+      <p:pic>
+        <p:nvPicPr>
+          <p:cNvPr id="5124" name="Picture 4" descr="14,357 Address Icons - Free in SVG, PNG, ICO - IconScout">
+            <a:extLst>
+              <a:ext uri="{FF2B5EF4-FFF2-40B4-BE49-F238E27FC236}">
+                <a16:creationId xmlns:a16="http://schemas.microsoft.com/office/drawing/2014/main" id="{8013BB89-5498-B8FB-3AC0-C5336E606A39}"/>
+              </a:ext>
+            </a:extLst>
+          </p:cNvPr>
+          <p:cNvPicPr>
+            <a:picLocks noChangeAspect="1" noChangeArrowheads="1"/>
+          </p:cNvPicPr>
+          <p:nvPr/>
+        </p:nvPicPr>
+        <p:blipFill>
+          <a:blip r:embed="rId5">
+            <a:extLst>
+              <a:ext uri="{28A0092B-C50C-407E-A947-70E740481C1C}">
+                <a14:useLocalDpi xmlns:a14="http://schemas.microsoft.com/office/drawing/2010/main" val="0"/>
+              </a:ext>
+            </a:extLst>
+          </a:blip>
+          <a:srcRect/>
+          <a:stretch>
+            <a:fillRect/>
+          </a:stretch>
+        </p:blipFill>
+        <p:spPr bwMode="auto">
+          <a:xfrm>
+            <a:off x="2810565" y="2835964"/>
+            <a:ext cx="3251200" cy="3251200"/>
+          </a:xfrm>
+          <a:prstGeom prst="rect">
+            <a:avLst/>
+          </a:prstGeom>
+          <a:noFill/>
+          <a:extLst>
+            <a:ext uri="{909E8E84-426E-40DD-AFC4-6F175D3DCCD1}">
+              <a14:hiddenFill xmlns:a14="http://schemas.microsoft.com/office/drawing/2010/main">
+                <a:solidFill>
+                  <a:srgbClr val="FFFFFF"/>
+                </a:solidFill>
+              </a14:hiddenFill>
+            </a:ext>
+          </a:extLst>
+        </p:spPr>
+      </p:pic>
+      <p:sp>
+        <p:nvSpPr>
+          <p:cNvPr id="2" name="Rectangle: Rounded Corners 1">
+            <a:extLst>
+              <a:ext uri="{FF2B5EF4-FFF2-40B4-BE49-F238E27FC236}">
+                <a16:creationId xmlns:a16="http://schemas.microsoft.com/office/drawing/2014/main" id="{C46315C8-BAF1-5B47-3E84-6BEFCE336126}"/>
+              </a:ext>
+            </a:extLst>
+          </p:cNvPr>
+          <p:cNvSpPr/>
+          <p:nvPr/>
+        </p:nvSpPr>
+        <p:spPr>
+          <a:xfrm>
+            <a:off x="2187114" y="1498600"/>
+            <a:ext cx="4297680" cy="914400"/>
+          </a:xfrm>
+          <a:prstGeom prst="roundRect">
+            <a:avLst/>
+          </a:prstGeom>
+        </p:spPr>
+        <p:style>
+          <a:lnRef idx="2">
+            <a:schemeClr val="accent1">
+              <a:shade val="15000"/>
+            </a:schemeClr>
+          </a:lnRef>
+          <a:fillRef idx="1">
+            <a:schemeClr val="accent1"/>
+          </a:fillRef>
+          <a:effectRef idx="0">
+            <a:schemeClr val="accent1"/>
+          </a:effectRef>
+          <a:fontRef idx="minor">
+            <a:schemeClr val="lt1"/>
+          </a:fontRef>
+        </p:style>
+        <p:txBody>
+          <a:bodyPr rtlCol="0" anchor="ctr"/>
+          <a:lstStyle/>
+          <a:p>
+            <a:pPr algn="ctr"/>
+            <a:r>
+              <a:rPr lang="en-US" dirty="0"/>
+              <a:t>Venue:  Mayfair United Church902 33rd St W, Saskatoon, SK S7L 0W6</a:t>
+            </a:r>
+          </a:p>
+          <a:p>
+            <a:pPr algn="ctr"/>
+            <a:r>
+              <a:rPr lang="en-US" dirty="0"/>
+              <a:t>Date: Saturday Dec 16, 2023Time: 5.30pm</a:t>
+            </a:r>
+            <a:endParaRPr lang="en-CA" dirty="0"/>
+          </a:p>
+        </p:txBody>
+      </p:sp>
+    </p:spTree>
+    <p:extLst>
+      <p:ext uri="{BB962C8B-B14F-4D97-AF65-F5344CB8AC3E}">
+        <p14:creationId xmlns:p14="http://schemas.microsoft.com/office/powerpoint/2010/main" val="4113317159"/>
+      </p:ext>
+    </p:extLst>
+  </p:cSld>
+  <p:clrMapOvr>
+    <a:masterClrMapping/>
+  </p:clrMapOvr>
+</p:sld>
+</file>
+
+<file path=ppt/slides/slide5.xml><?xml version="1.0" encoding="utf-8"?>
+<p:sld xmlns:a="http://schemas.openxmlformats.org/drawingml/2006/main" xmlns:r="http://schemas.openxmlformats.org/officeDocument/2006/relationships" xmlns:p="http://schemas.openxmlformats.org/presentationml/2006/main">
+  <p:cSld>
+    <p:bg>
+      <p:bgPr>
         <a:solidFill>
           <a:schemeClr val="bg1"/>
         </a:solidFill>
@@ -3497,7 +4900,7 @@
                 <a:ea typeface="Segoe UI Black" panose="020B0A02040204020203" pitchFamily="34" charset="0"/>
                 <a:cs typeface="Sans Serif Collection" panose="020B0502040504020204" pitchFamily="34" charset="0"/>
               </a:rPr>
-              <a:t>SATURDAY</a:t>
+              <a:t>SUNDAY</a:t>
             </a:r>
           </a:p>
           <a:p>
@@ -3511,7 +4914,7 @@
                 <a:ea typeface="Segoe UI Black" panose="020B0A02040204020203" pitchFamily="34" charset="0"/>
                 <a:cs typeface="Sans Serif Collection" panose="020B0502040504020204" pitchFamily="34" charset="0"/>
               </a:rPr>
-              <a:t>16 DEC, 2023</a:t>
+              <a:t>17 DEC, 2023</a:t>
             </a:r>
           </a:p>
         </p:txBody>
@@ -3638,24 +5041,18 @@
                 <a:latin typeface="Segoe UI Black" panose="020B0A02040204020203" pitchFamily="34" charset="0"/>
                 <a:ea typeface="Segoe UI Black" panose="020B0A02040204020203" pitchFamily="34" charset="0"/>
               </a:rPr>
-              <a:t>Mayfair United Church</a:t>
-            </a:r>
-          </a:p>
-          <a:p>
-            <a:pPr algn="r" rtl="0"/>
-            <a:r>
-              <a:rPr lang="en-US" sz="2000" b="0" i="0" u="none" strike="noStrike" kern="1200" baseline="0" dirty="0">
+              <a:t>St. P</a:t>
+            </a:r>
+            <a:r>
+              <a:rPr lang="en-US" sz="2000" dirty="0">
                 <a:solidFill>
                   <a:srgbClr val="106A48"/>
                 </a:solidFill>
                 <a:latin typeface="Segoe UI Black" panose="020B0A02040204020203" pitchFamily="34" charset="0"/>
                 <a:ea typeface="Segoe UI Black" panose="020B0A02040204020203" pitchFamily="34" charset="0"/>
               </a:rPr>
-              <a:t>902 33rd St W </a:t>
-            </a:r>
-          </a:p>
-          <a:p>
-            <a:pPr algn="r" rtl="0"/>
+              <a:t>aul’s</a:t>
+            </a:r>
             <a:r>
               <a:rPr lang="en-US" sz="2000" b="0" i="0" u="none" strike="noStrike" kern="1200" baseline="0" dirty="0">
                 <a:solidFill>
@@ -3664,7 +5061,33 @@
                 <a:latin typeface="Segoe UI Black" panose="020B0A02040204020203" pitchFamily="34" charset="0"/>
                 <a:ea typeface="Segoe UI Black" panose="020B0A02040204020203" pitchFamily="34" charset="0"/>
               </a:rPr>
-              <a:t>Saskatoon, SK S7L 0W6</a:t>
+              <a:t> United Church</a:t>
+            </a:r>
+          </a:p>
+          <a:p>
+            <a:pPr algn="r" rtl="0"/>
+            <a:r>
+              <a:rPr lang="en-US" sz="2000" b="0" i="0" u="none" strike="noStrike" kern="1200" baseline="0" dirty="0">
+                <a:solidFill>
+                  <a:srgbClr val="106A48"/>
+                </a:solidFill>
+                <a:latin typeface="Segoe UI Black" panose="020B0A02040204020203" pitchFamily="34" charset="0"/>
+                <a:ea typeface="Segoe UI Black" panose="020B0A02040204020203" pitchFamily="34" charset="0"/>
+              </a:rPr>
+              <a:t>454 Egbert Ave </a:t>
+            </a:r>
+          </a:p>
+          <a:p>
+            <a:pPr algn="r" rtl="0"/>
+            <a:r>
+              <a:rPr lang="en-US" sz="2000" b="0" i="0" u="none" strike="noStrike" kern="1200" baseline="0" dirty="0">
+                <a:solidFill>
+                  <a:srgbClr val="106A48"/>
+                </a:solidFill>
+                <a:latin typeface="Segoe UI Black" panose="020B0A02040204020203" pitchFamily="34" charset="0"/>
+                <a:ea typeface="Segoe UI Black" panose="020B0A02040204020203" pitchFamily="34" charset="0"/>
+              </a:rPr>
+              <a:t>Saskatoon, SK S7N 1X3</a:t>
             </a:r>
           </a:p>
         </p:txBody>
@@ -3698,7 +5121,7 @@
         </p:blipFill>
         <p:spPr bwMode="auto">
           <a:xfrm>
-            <a:off x="3232834" y="1726373"/>
+            <a:off x="3102203" y="1726373"/>
             <a:ext cx="653587" cy="653587"/>
           </a:xfrm>
           <a:prstGeom prst="rect">
@@ -4109,7 +5532,957 @@
 </p:sld>
 </file>
 
-<file path=ppt/slides/slide4.xml><?xml version="1.0" encoding="utf-8"?>
+<file path=ppt/slides/slide6.xml><?xml version="1.0" encoding="utf-8"?>
+<p:sld xmlns:a="http://schemas.openxmlformats.org/drawingml/2006/main" xmlns:r="http://schemas.openxmlformats.org/officeDocument/2006/relationships" xmlns:p="http://schemas.openxmlformats.org/presentationml/2006/main">
+  <p:cSld>
+    <p:bg>
+      <p:bgPr>
+        <a:solidFill>
+          <a:schemeClr val="bg1"/>
+        </a:solidFill>
+        <a:effectLst/>
+      </p:bgPr>
+    </p:bg>
+    <p:spTree>
+      <p:nvGrpSpPr>
+        <p:cNvPr id="1" name=""/>
+        <p:cNvGrpSpPr/>
+        <p:nvPr/>
+      </p:nvGrpSpPr>
+      <p:grpSpPr>
+        <a:xfrm>
+          <a:off x="0" y="0"/>
+          <a:ext cx="0" cy="0"/>
+          <a:chOff x="0" y="0"/>
+          <a:chExt cx="0" cy="0"/>
+        </a:xfrm>
+      </p:grpSpPr>
+      <p:pic>
+        <p:nvPicPr>
+          <p:cNvPr id="4" name="Picture 3">
+            <a:extLst>
+              <a:ext uri="{FF2B5EF4-FFF2-40B4-BE49-F238E27FC236}">
+                <a16:creationId xmlns:a16="http://schemas.microsoft.com/office/drawing/2014/main" id="{1D702294-E345-1489-EDBB-2459596FCD5A}"/>
+              </a:ext>
+            </a:extLst>
+          </p:cNvPr>
+          <p:cNvPicPr>
+            <a:picLocks noChangeAspect="1"/>
+          </p:cNvPicPr>
+          <p:nvPr/>
+        </p:nvPicPr>
+        <p:blipFill>
+          <a:blip r:embed="rId2"/>
+          <a:stretch>
+            <a:fillRect/>
+          </a:stretch>
+        </p:blipFill>
+        <p:spPr>
+          <a:xfrm>
+            <a:off x="-108375" y="-75501"/>
+            <a:ext cx="7163516" cy="8848158"/>
+          </a:xfrm>
+          <a:prstGeom prst="rect">
+            <a:avLst/>
+          </a:prstGeom>
+        </p:spPr>
+      </p:pic>
+      <p:sp>
+        <p:nvSpPr>
+          <p:cNvPr id="7" name="Rounded Rectangle 13">
+            <a:extLst>
+              <a:ext uri="{FF2B5EF4-FFF2-40B4-BE49-F238E27FC236}">
+                <a16:creationId xmlns:a16="http://schemas.microsoft.com/office/drawing/2014/main" id="{D3804B58-4AA8-A24D-7F2A-052A587F4D20}"/>
+              </a:ext>
+            </a:extLst>
+          </p:cNvPr>
+          <p:cNvSpPr/>
+          <p:nvPr/>
+        </p:nvSpPr>
+        <p:spPr>
+          <a:xfrm>
+            <a:off x="2537492" y="998246"/>
+            <a:ext cx="4385377" cy="833652"/>
+          </a:xfrm>
+          <a:prstGeom prst="roundRect">
+            <a:avLst>
+              <a:gd name="adj" fmla="val 0"/>
+            </a:avLst>
+          </a:prstGeom>
+          <a:solidFill>
+            <a:srgbClr val="F6F6F6"/>
+          </a:solidFill>
+          <a:ln>
+            <a:noFill/>
+          </a:ln>
+        </p:spPr>
+        <p:style>
+          <a:lnRef idx="2">
+            <a:schemeClr val="accent1">
+              <a:shade val="15000"/>
+            </a:schemeClr>
+          </a:lnRef>
+          <a:fillRef idx="1">
+            <a:schemeClr val="accent1"/>
+          </a:fillRef>
+          <a:effectRef idx="0">
+            <a:schemeClr val="accent1"/>
+          </a:effectRef>
+          <a:fontRef idx="minor">
+            <a:schemeClr val="lt1"/>
+          </a:fontRef>
+        </p:style>
+        <p:txBody>
+          <a:bodyPr rtlCol="0" anchor="ctr"/>
+          <a:lstStyle/>
+          <a:p>
+            <a:pPr algn="r"/>
+            <a:r>
+              <a:rPr lang="en-US" sz="2000" dirty="0">
+                <a:solidFill>
+                  <a:srgbClr val="106A48"/>
+                </a:solidFill>
+                <a:latin typeface="Segoe UI Black" panose="020B0A02040204020203" pitchFamily="34" charset="0"/>
+                <a:ea typeface="Segoe UI Black" panose="020B0A02040204020203" pitchFamily="34" charset="0"/>
+                <a:cs typeface="Sans Serif Collection" panose="020B0502040504020204" pitchFamily="34" charset="0"/>
+              </a:rPr>
+              <a:t>SUNDAY, 17 DEC, 2023</a:t>
+            </a:r>
+          </a:p>
+          <a:p>
+            <a:pPr algn="r"/>
+            <a:r>
+              <a:rPr lang="en-US" sz="2000" dirty="0">
+                <a:solidFill>
+                  <a:srgbClr val="106A48"/>
+                </a:solidFill>
+                <a:latin typeface="Segoe UI Black" panose="020B0A02040204020203" pitchFamily="34" charset="0"/>
+                <a:ea typeface="Segoe UI Black" panose="020B0A02040204020203" pitchFamily="34" charset="0"/>
+                <a:cs typeface="Sans Serif Collection" panose="020B0502040504020204" pitchFamily="34" charset="0"/>
+              </a:rPr>
+              <a:t> 5:30 PM</a:t>
+            </a:r>
+          </a:p>
+        </p:txBody>
+      </p:sp>
+      <p:sp>
+        <p:nvSpPr>
+          <p:cNvPr id="8" name="Rounded Rectangle 13">
+            <a:extLst>
+              <a:ext uri="{FF2B5EF4-FFF2-40B4-BE49-F238E27FC236}">
+                <a16:creationId xmlns:a16="http://schemas.microsoft.com/office/drawing/2014/main" id="{F2F3ABB4-FAC0-1678-04E1-DC7FCACEB2FE}"/>
+              </a:ext>
+            </a:extLst>
+          </p:cNvPr>
+          <p:cNvSpPr/>
+          <p:nvPr/>
+        </p:nvSpPr>
+        <p:spPr>
+          <a:xfrm>
+            <a:off x="3366050" y="1741865"/>
+            <a:ext cx="3556819" cy="1119523"/>
+          </a:xfrm>
+          <a:prstGeom prst="roundRect">
+            <a:avLst>
+              <a:gd name="adj" fmla="val 0"/>
+            </a:avLst>
+          </a:prstGeom>
+          <a:solidFill>
+            <a:srgbClr val="F6F6F6"/>
+          </a:solidFill>
+          <a:ln>
+            <a:noFill/>
+          </a:ln>
+        </p:spPr>
+        <p:style>
+          <a:lnRef idx="2">
+            <a:schemeClr val="accent1">
+              <a:shade val="15000"/>
+            </a:schemeClr>
+          </a:lnRef>
+          <a:fillRef idx="1">
+            <a:schemeClr val="accent1"/>
+          </a:fillRef>
+          <a:effectRef idx="0">
+            <a:schemeClr val="accent1"/>
+          </a:effectRef>
+          <a:fontRef idx="minor">
+            <a:schemeClr val="lt1"/>
+          </a:fontRef>
+        </p:style>
+        <p:txBody>
+          <a:bodyPr rtlCol="0" anchor="ctr"/>
+          <a:lstStyle/>
+          <a:p>
+            <a:pPr algn="r" rtl="0"/>
+            <a:r>
+              <a:rPr lang="en-US" sz="2000" b="0" i="0" u="none" strike="noStrike" kern="1200" baseline="0" dirty="0">
+                <a:solidFill>
+                  <a:srgbClr val="106A48"/>
+                </a:solidFill>
+                <a:latin typeface="Segoe UI Black" panose="020B0A02040204020203" pitchFamily="34" charset="0"/>
+                <a:ea typeface="Segoe UI Black" panose="020B0A02040204020203" pitchFamily="34" charset="0"/>
+              </a:rPr>
+              <a:t>St. P</a:t>
+            </a:r>
+            <a:r>
+              <a:rPr lang="en-US" sz="2000" dirty="0">
+                <a:solidFill>
+                  <a:srgbClr val="106A48"/>
+                </a:solidFill>
+                <a:latin typeface="Segoe UI Black" panose="020B0A02040204020203" pitchFamily="34" charset="0"/>
+                <a:ea typeface="Segoe UI Black" panose="020B0A02040204020203" pitchFamily="34" charset="0"/>
+              </a:rPr>
+              <a:t>aul’s</a:t>
+            </a:r>
+            <a:r>
+              <a:rPr lang="en-US" sz="2000" b="0" i="0" u="none" strike="noStrike" kern="1200" baseline="0" dirty="0">
+                <a:solidFill>
+                  <a:srgbClr val="106A48"/>
+                </a:solidFill>
+                <a:latin typeface="Segoe UI Black" panose="020B0A02040204020203" pitchFamily="34" charset="0"/>
+                <a:ea typeface="Segoe UI Black" panose="020B0A02040204020203" pitchFamily="34" charset="0"/>
+              </a:rPr>
+              <a:t> United Church</a:t>
+            </a:r>
+          </a:p>
+          <a:p>
+            <a:pPr algn="r" rtl="0"/>
+            <a:r>
+              <a:rPr lang="en-US" sz="2000" b="0" i="0" u="none" strike="noStrike" kern="1200" baseline="0" dirty="0">
+                <a:solidFill>
+                  <a:srgbClr val="106A48"/>
+                </a:solidFill>
+                <a:latin typeface="Segoe UI Black" panose="020B0A02040204020203" pitchFamily="34" charset="0"/>
+                <a:ea typeface="Segoe UI Black" panose="020B0A02040204020203" pitchFamily="34" charset="0"/>
+              </a:rPr>
+              <a:t>454 Egbert Ave </a:t>
+            </a:r>
+          </a:p>
+          <a:p>
+            <a:pPr algn="r" rtl="0"/>
+            <a:r>
+              <a:rPr lang="en-US" sz="2000" b="0" i="0" u="none" strike="noStrike" kern="1200" baseline="0" dirty="0">
+                <a:solidFill>
+                  <a:srgbClr val="106A48"/>
+                </a:solidFill>
+                <a:latin typeface="Segoe UI Black" panose="020B0A02040204020203" pitchFamily="34" charset="0"/>
+                <a:ea typeface="Segoe UI Black" panose="020B0A02040204020203" pitchFamily="34" charset="0"/>
+              </a:rPr>
+              <a:t>Saskatoon, SK S7N 1X3</a:t>
+            </a:r>
+          </a:p>
+        </p:txBody>
+      </p:sp>
+      <p:pic>
+        <p:nvPicPr>
+          <p:cNvPr id="9" name="Picture 8" descr="Location - Free maps and location icons">
+            <a:extLst>
+              <a:ext uri="{FF2B5EF4-FFF2-40B4-BE49-F238E27FC236}">
+                <a16:creationId xmlns:a16="http://schemas.microsoft.com/office/drawing/2014/main" id="{D4205167-A9EE-1872-F433-00F05F3C6456}"/>
+              </a:ext>
+            </a:extLst>
+          </p:cNvPr>
+          <p:cNvPicPr>
+            <a:picLocks noChangeAspect="1" noChangeArrowheads="1"/>
+          </p:cNvPicPr>
+          <p:nvPr/>
+        </p:nvPicPr>
+        <p:blipFill>
+          <a:blip r:embed="rId3">
+            <a:extLst>
+              <a:ext uri="{28A0092B-C50C-407E-A947-70E740481C1C}">
+                <a14:useLocalDpi xmlns:a14="http://schemas.microsoft.com/office/drawing/2010/main" val="0"/>
+              </a:ext>
+            </a:extLst>
+          </a:blip>
+          <a:srcRect/>
+          <a:stretch>
+            <a:fillRect/>
+          </a:stretch>
+        </p:blipFill>
+        <p:spPr bwMode="auto">
+          <a:xfrm>
+            <a:off x="3313217" y="1872658"/>
+            <a:ext cx="320331" cy="320331"/>
+          </a:xfrm>
+          <a:prstGeom prst="rect">
+            <a:avLst/>
+          </a:prstGeom>
+          <a:noFill/>
+          <a:extLst>
+            <a:ext uri="{909E8E84-426E-40DD-AFC4-6F175D3DCCD1}">
+              <a14:hiddenFill xmlns:a14="http://schemas.microsoft.com/office/drawing/2010/main">
+                <a:solidFill>
+                  <a:srgbClr val="FFFFFF"/>
+                </a:solidFill>
+              </a14:hiddenFill>
+            </a:ext>
+          </a:extLst>
+        </p:spPr>
+      </p:pic>
+      <p:pic>
+        <p:nvPicPr>
+          <p:cNvPr id="22" name="Picture 21" descr="A green and red flag with a red circle on a pole&#10;&#10;Description automatically generated">
+            <a:extLst>
+              <a:ext uri="{FF2B5EF4-FFF2-40B4-BE49-F238E27FC236}">
+                <a16:creationId xmlns:a16="http://schemas.microsoft.com/office/drawing/2014/main" id="{C8845AC2-6B63-D602-EBFD-256078E398C7}"/>
+              </a:ext>
+            </a:extLst>
+          </p:cNvPr>
+          <p:cNvPicPr>
+            <a:picLocks noChangeAspect="1"/>
+          </p:cNvPicPr>
+          <p:nvPr/>
+        </p:nvPicPr>
+        <p:blipFill>
+          <a:blip r:embed="rId4"/>
+          <a:stretch>
+            <a:fillRect/>
+          </a:stretch>
+        </p:blipFill>
+        <p:spPr>
+          <a:xfrm rot="20878311">
+            <a:off x="1375627" y="4610261"/>
+            <a:ext cx="3146865" cy="3146865"/>
+          </a:xfrm>
+          <a:prstGeom prst="rect">
+            <a:avLst/>
+          </a:prstGeom>
+        </p:spPr>
+      </p:pic>
+      <p:sp>
+        <p:nvSpPr>
+          <p:cNvPr id="2" name="TextBox 1">
+            <a:extLst>
+              <a:ext uri="{FF2B5EF4-FFF2-40B4-BE49-F238E27FC236}">
+                <a16:creationId xmlns:a16="http://schemas.microsoft.com/office/drawing/2014/main" id="{B715203B-5210-75DA-3F2A-8E72F2C81BFB}"/>
+              </a:ext>
+            </a:extLst>
+          </p:cNvPr>
+          <p:cNvSpPr txBox="1"/>
+          <p:nvPr/>
+        </p:nvSpPr>
+        <p:spPr>
+          <a:xfrm>
+            <a:off x="-63978" y="7672901"/>
+            <a:ext cx="6987743" cy="1477328"/>
+          </a:xfrm>
+          <a:prstGeom prst="rect">
+            <a:avLst/>
+          </a:prstGeom>
+          <a:solidFill>
+            <a:srgbClr val="106A48"/>
+          </a:solidFill>
+        </p:spPr>
+        <p:txBody>
+          <a:bodyPr wrap="square">
+            <a:spAutoFit/>
+          </a:bodyPr>
+          <a:lstStyle/>
+          <a:p>
+            <a:pPr algn="ctr"/>
+            <a:r>
+              <a:rPr lang="en-CA" b="1" i="0" dirty="0">
+                <a:solidFill>
+                  <a:schemeClr val="bg1"/>
+                </a:solidFill>
+                <a:effectLst/>
+                <a:latin typeface="arial" panose="020B0604020202020204" pitchFamily="34" charset="0"/>
+              </a:rPr>
+              <a:t>OUR SPONSORS</a:t>
+            </a:r>
+          </a:p>
+          <a:p>
+            <a:pPr algn="ctr"/>
+            <a:r>
+              <a:rPr lang="en-CA" b="0" i="0" dirty="0">
+                <a:solidFill>
+                  <a:schemeClr val="bg1"/>
+                </a:solidFill>
+                <a:effectLst/>
+                <a:latin typeface="arial" panose="020B0604020202020204" pitchFamily="34" charset="0"/>
+              </a:rPr>
+              <a:t>•</a:t>
+            </a:r>
+            <a:r>
+              <a:rPr lang="en-CA" dirty="0">
+                <a:solidFill>
+                  <a:schemeClr val="bg1"/>
+                </a:solidFill>
+              </a:rPr>
+              <a:t>Priyanka Nandi </a:t>
+            </a:r>
+            <a:r>
+              <a:rPr lang="en-CA" b="0" i="0" dirty="0">
+                <a:solidFill>
+                  <a:schemeClr val="bg1"/>
+                </a:solidFill>
+                <a:effectLst/>
+                <a:latin typeface="arial" panose="020B0604020202020204" pitchFamily="34" charset="0"/>
+              </a:rPr>
+              <a:t>•</a:t>
+            </a:r>
+            <a:r>
+              <a:rPr lang="en-CA" dirty="0">
+                <a:solidFill>
+                  <a:schemeClr val="bg1"/>
+                </a:solidFill>
+              </a:rPr>
+              <a:t>Feroza Financial </a:t>
+            </a:r>
+            <a:r>
+              <a:rPr lang="en-CA" b="0" i="0" dirty="0">
+                <a:solidFill>
+                  <a:schemeClr val="bg1"/>
+                </a:solidFill>
+                <a:effectLst/>
+                <a:latin typeface="arial" panose="020B0604020202020204" pitchFamily="34" charset="0"/>
+              </a:rPr>
+              <a:t>•</a:t>
+            </a:r>
+            <a:r>
+              <a:rPr lang="en-CA" dirty="0">
+                <a:solidFill>
+                  <a:schemeClr val="bg1"/>
+                </a:solidFill>
+              </a:rPr>
+              <a:t>S M Auto Sales Ltd. </a:t>
+            </a:r>
+            <a:r>
+              <a:rPr lang="en-CA" b="0" i="0" dirty="0">
+                <a:solidFill>
+                  <a:schemeClr val="bg1"/>
+                </a:solidFill>
+                <a:effectLst/>
+                <a:latin typeface="arial" panose="020B0604020202020204" pitchFamily="34" charset="0"/>
+              </a:rPr>
+              <a:t>•</a:t>
+            </a:r>
+            <a:r>
+              <a:rPr lang="en-CA" dirty="0">
+                <a:solidFill>
+                  <a:schemeClr val="bg1"/>
+                </a:solidFill>
+              </a:rPr>
+              <a:t>Popular Auto </a:t>
+            </a:r>
+          </a:p>
+          <a:p>
+            <a:pPr algn="ctr"/>
+            <a:r>
+              <a:rPr lang="en-CA" b="0" i="0" dirty="0">
+                <a:solidFill>
+                  <a:schemeClr val="bg1"/>
+                </a:solidFill>
+                <a:effectLst/>
+                <a:latin typeface="arial" panose="020B0604020202020204" pitchFamily="34" charset="0"/>
+              </a:rPr>
+              <a:t>•</a:t>
+            </a:r>
+            <a:r>
+              <a:rPr lang="en-CA" dirty="0">
+                <a:solidFill>
+                  <a:schemeClr val="bg1"/>
+                </a:solidFill>
+              </a:rPr>
+              <a:t>Sky Motors </a:t>
+            </a:r>
+            <a:r>
+              <a:rPr lang="en-CA" b="0" i="0" dirty="0">
+                <a:solidFill>
+                  <a:schemeClr val="bg1"/>
+                </a:solidFill>
+                <a:effectLst/>
+                <a:latin typeface="arial" panose="020B0604020202020204" pitchFamily="34" charset="0"/>
+              </a:rPr>
+              <a:t>•</a:t>
+            </a:r>
+            <a:r>
+              <a:rPr lang="en-CA" dirty="0">
+                <a:solidFill>
+                  <a:schemeClr val="bg1"/>
+                </a:solidFill>
+              </a:rPr>
+              <a:t>Economy Auto Repair </a:t>
+            </a:r>
+            <a:r>
+              <a:rPr lang="en-CA" b="0" i="0" dirty="0">
+                <a:solidFill>
+                  <a:schemeClr val="bg1"/>
+                </a:solidFill>
+                <a:effectLst/>
+                <a:latin typeface="arial" panose="020B0604020202020204" pitchFamily="34" charset="0"/>
+              </a:rPr>
+              <a:t>•</a:t>
+            </a:r>
+            <a:r>
+              <a:rPr lang="en-CA" dirty="0">
+                <a:solidFill>
+                  <a:schemeClr val="bg1"/>
+                </a:solidFill>
+              </a:rPr>
+              <a:t>Nas-Motive Auto Sales &amp; Services </a:t>
+            </a:r>
+            <a:r>
+              <a:rPr lang="en-CA" b="0" i="0" dirty="0">
+                <a:solidFill>
+                  <a:schemeClr val="bg1"/>
+                </a:solidFill>
+                <a:effectLst/>
+                <a:latin typeface="arial" panose="020B0604020202020204" pitchFamily="34" charset="0"/>
+              </a:rPr>
+              <a:t>•</a:t>
+            </a:r>
+            <a:r>
+              <a:rPr lang="en-CA" dirty="0">
+                <a:solidFill>
+                  <a:schemeClr val="bg1"/>
+                </a:solidFill>
+              </a:rPr>
+              <a:t>Confederation Inn &amp; Suites </a:t>
+            </a:r>
+            <a:r>
+              <a:rPr lang="en-CA" b="0" i="0" dirty="0">
+                <a:solidFill>
+                  <a:schemeClr val="bg1"/>
+                </a:solidFill>
+                <a:effectLst/>
+                <a:latin typeface="arial" panose="020B0604020202020204" pitchFamily="34" charset="0"/>
+              </a:rPr>
+              <a:t>•</a:t>
+            </a:r>
+            <a:r>
+              <a:rPr lang="en-CA" dirty="0">
+                <a:solidFill>
+                  <a:schemeClr val="bg1"/>
+                </a:solidFill>
+              </a:rPr>
+              <a:t>First Choice Supermarket &amp; Halal Meat</a:t>
+            </a:r>
+            <a:r>
+              <a:rPr lang="en-CA" b="0" i="0" dirty="0">
+                <a:solidFill>
+                  <a:schemeClr val="bg1"/>
+                </a:solidFill>
+                <a:effectLst/>
+                <a:latin typeface="arial" panose="020B0604020202020204" pitchFamily="34" charset="0"/>
+              </a:rPr>
+              <a:t> •</a:t>
+            </a:r>
+            <a:r>
+              <a:rPr lang="en-CA" dirty="0" err="1">
+                <a:solidFill>
+                  <a:schemeClr val="bg1"/>
+                </a:solidFill>
+              </a:rPr>
+              <a:t>Beautyleven</a:t>
+            </a:r>
+            <a:r>
+              <a:rPr lang="en-CA" dirty="0">
+                <a:solidFill>
+                  <a:schemeClr val="bg1"/>
+                </a:solidFill>
+              </a:rPr>
+              <a:t> Canada </a:t>
+            </a:r>
+            <a:r>
+              <a:rPr lang="en-CA" b="0" i="0" dirty="0">
+                <a:solidFill>
+                  <a:schemeClr val="bg1"/>
+                </a:solidFill>
+                <a:effectLst/>
+                <a:latin typeface="arial" panose="020B0604020202020204" pitchFamily="34" charset="0"/>
+              </a:rPr>
+              <a:t>•</a:t>
+            </a:r>
+            <a:r>
+              <a:rPr lang="en-CA" dirty="0">
+                <a:solidFill>
+                  <a:schemeClr val="bg1"/>
+                </a:solidFill>
+              </a:rPr>
+              <a:t>Guide Me Immigration</a:t>
+            </a:r>
+          </a:p>
+        </p:txBody>
+      </p:sp>
+      <p:sp>
+        <p:nvSpPr>
+          <p:cNvPr id="6" name="Rectangle 5">
+            <a:extLst>
+              <a:ext uri="{FF2B5EF4-FFF2-40B4-BE49-F238E27FC236}">
+                <a16:creationId xmlns:a16="http://schemas.microsoft.com/office/drawing/2014/main" id="{2AF45326-0ADE-BD14-EBE7-54AC47A03684}"/>
+              </a:ext>
+            </a:extLst>
+          </p:cNvPr>
+          <p:cNvSpPr/>
+          <p:nvPr/>
+        </p:nvSpPr>
+        <p:spPr>
+          <a:xfrm>
+            <a:off x="119188" y="85541"/>
+            <a:ext cx="1750803" cy="799608"/>
+          </a:xfrm>
+          <a:prstGeom prst="rect">
+            <a:avLst/>
+          </a:prstGeom>
+          <a:solidFill>
+            <a:srgbClr val="F6F6F6"/>
+          </a:solidFill>
+          <a:ln>
+            <a:noFill/>
+          </a:ln>
+        </p:spPr>
+        <p:style>
+          <a:lnRef idx="2">
+            <a:schemeClr val="accent1">
+              <a:shade val="15000"/>
+            </a:schemeClr>
+          </a:lnRef>
+          <a:fillRef idx="1">
+            <a:schemeClr val="accent1"/>
+          </a:fillRef>
+          <a:effectRef idx="0">
+            <a:schemeClr val="accent1"/>
+          </a:effectRef>
+          <a:fontRef idx="minor">
+            <a:schemeClr val="lt1"/>
+          </a:fontRef>
+        </p:style>
+        <p:txBody>
+          <a:bodyPr rtlCol="0" anchor="ctr"/>
+          <a:lstStyle/>
+          <a:p>
+            <a:pPr algn="ctr"/>
+            <a:endParaRPr lang="en-CA"/>
+          </a:p>
+        </p:txBody>
+      </p:sp>
+      <p:pic>
+        <p:nvPicPr>
+          <p:cNvPr id="12" name="Picture 2" descr="Time Clock icon sign design 9341969 PNG">
+            <a:extLst>
+              <a:ext uri="{FF2B5EF4-FFF2-40B4-BE49-F238E27FC236}">
+                <a16:creationId xmlns:a16="http://schemas.microsoft.com/office/drawing/2014/main" id="{A20633D8-0446-14A5-A572-9CB4708A3893}"/>
+              </a:ext>
+            </a:extLst>
+          </p:cNvPr>
+          <p:cNvPicPr>
+            <a:picLocks noChangeAspect="1" noChangeArrowheads="1"/>
+          </p:cNvPicPr>
+          <p:nvPr/>
+        </p:nvPicPr>
+        <p:blipFill>
+          <a:blip r:embed="rId5">
+            <a:extLst>
+              <a:ext uri="{28A0092B-C50C-407E-A947-70E740481C1C}">
+                <a14:useLocalDpi xmlns:a14="http://schemas.microsoft.com/office/drawing/2010/main" val="0"/>
+              </a:ext>
+            </a:extLst>
+          </a:blip>
+          <a:srcRect/>
+          <a:stretch>
+            <a:fillRect/>
+          </a:stretch>
+        </p:blipFill>
+        <p:spPr bwMode="auto">
+          <a:xfrm>
+            <a:off x="3356466" y="1541427"/>
+            <a:ext cx="233833" cy="238921"/>
+          </a:xfrm>
+          <a:prstGeom prst="rect">
+            <a:avLst/>
+          </a:prstGeom>
+          <a:noFill/>
+          <a:extLst>
+            <a:ext uri="{909E8E84-426E-40DD-AFC4-6F175D3DCCD1}">
+              <a14:hiddenFill xmlns:a14="http://schemas.microsoft.com/office/drawing/2010/main">
+                <a:solidFill>
+                  <a:srgbClr val="FFFFFF"/>
+                </a:solidFill>
+              </a14:hiddenFill>
+            </a:ext>
+          </a:extLst>
+        </p:spPr>
+      </p:pic>
+      <p:pic>
+        <p:nvPicPr>
+          <p:cNvPr id="13" name="Picture 2" descr="Calendar icon - Free download on Iconfinder">
+            <a:extLst>
+              <a:ext uri="{FF2B5EF4-FFF2-40B4-BE49-F238E27FC236}">
+                <a16:creationId xmlns:a16="http://schemas.microsoft.com/office/drawing/2014/main" id="{A714BF5A-37E2-AC41-04A7-654CDE56EA15}"/>
+              </a:ext>
+            </a:extLst>
+          </p:cNvPr>
+          <p:cNvPicPr>
+            <a:picLocks noChangeAspect="1" noChangeArrowheads="1"/>
+          </p:cNvPicPr>
+          <p:nvPr/>
+        </p:nvPicPr>
+        <p:blipFill>
+          <a:blip r:embed="rId6">
+            <a:extLst>
+              <a:ext uri="{28A0092B-C50C-407E-A947-70E740481C1C}">
+                <a14:useLocalDpi xmlns:a14="http://schemas.microsoft.com/office/drawing/2010/main" val="0"/>
+              </a:ext>
+            </a:extLst>
+          </a:blip>
+          <a:srcRect/>
+          <a:stretch>
+            <a:fillRect/>
+          </a:stretch>
+        </p:blipFill>
+        <p:spPr bwMode="auto">
+          <a:xfrm>
+            <a:off x="3266258" y="1100112"/>
+            <a:ext cx="414249" cy="414249"/>
+          </a:xfrm>
+          <a:prstGeom prst="rect">
+            <a:avLst/>
+          </a:prstGeom>
+          <a:noFill/>
+          <a:extLst>
+            <a:ext uri="{909E8E84-426E-40DD-AFC4-6F175D3DCCD1}">
+              <a14:hiddenFill xmlns:a14="http://schemas.microsoft.com/office/drawing/2010/main">
+                <a:solidFill>
+                  <a:srgbClr val="FFFFFF"/>
+                </a:solidFill>
+              </a14:hiddenFill>
+            </a:ext>
+          </a:extLst>
+        </p:spPr>
+      </p:pic>
+      <p:sp>
+        <p:nvSpPr>
+          <p:cNvPr id="16" name="Rectangle 15">
+            <a:extLst>
+              <a:ext uri="{FF2B5EF4-FFF2-40B4-BE49-F238E27FC236}">
+                <a16:creationId xmlns:a16="http://schemas.microsoft.com/office/drawing/2014/main" id="{F5BC4768-A85C-989E-B7EF-2838B6BDD615}"/>
+              </a:ext>
+            </a:extLst>
+          </p:cNvPr>
+          <p:cNvSpPr/>
+          <p:nvPr/>
+        </p:nvSpPr>
+        <p:spPr>
+          <a:xfrm>
+            <a:off x="-140326" y="-86358"/>
+            <a:ext cx="7227415" cy="1068138"/>
+          </a:xfrm>
+          <a:prstGeom prst="rect">
+            <a:avLst/>
+          </a:prstGeom>
+          <a:solidFill>
+            <a:schemeClr val="bg1"/>
+          </a:solidFill>
+          <a:ln>
+            <a:noFill/>
+          </a:ln>
+        </p:spPr>
+        <p:style>
+          <a:lnRef idx="2">
+            <a:schemeClr val="accent1">
+              <a:shade val="15000"/>
+            </a:schemeClr>
+          </a:lnRef>
+          <a:fillRef idx="1">
+            <a:schemeClr val="accent1"/>
+          </a:fillRef>
+          <a:effectRef idx="0">
+            <a:schemeClr val="accent1"/>
+          </a:effectRef>
+          <a:fontRef idx="minor">
+            <a:schemeClr val="lt1"/>
+          </a:fontRef>
+        </p:style>
+        <p:txBody>
+          <a:bodyPr rtlCol="0" anchor="ctr"/>
+          <a:lstStyle/>
+          <a:p>
+            <a:pPr algn="ctr"/>
+            <a:endParaRPr lang="en-US" dirty="0">
+              <a:solidFill>
+                <a:schemeClr val="bg1"/>
+              </a:solidFill>
+              <a:latin typeface="SolaimanLipi" panose="03000600000000000000" pitchFamily="66" charset="0"/>
+              <a:ea typeface="Noteworthy Light" panose="02000400000000000000" pitchFamily="2" charset="77"/>
+              <a:cs typeface="SolaimanLipi" panose="03000600000000000000" pitchFamily="66" charset="0"/>
+            </a:endParaRPr>
+          </a:p>
+        </p:txBody>
+      </p:sp>
+      <p:sp>
+        <p:nvSpPr>
+          <p:cNvPr id="5" name="Rectangle 4">
+            <a:extLst>
+              <a:ext uri="{FF2B5EF4-FFF2-40B4-BE49-F238E27FC236}">
+                <a16:creationId xmlns:a16="http://schemas.microsoft.com/office/drawing/2014/main" id="{2C180B44-C33D-F134-3B13-15EC73110EF1}"/>
+              </a:ext>
+            </a:extLst>
+          </p:cNvPr>
+          <p:cNvSpPr/>
+          <p:nvPr/>
+        </p:nvSpPr>
+        <p:spPr>
+          <a:xfrm>
+            <a:off x="-158709" y="-96958"/>
+            <a:ext cx="7245798" cy="1068138"/>
+          </a:xfrm>
+          <a:prstGeom prst="rect">
+            <a:avLst/>
+          </a:prstGeom>
+          <a:solidFill>
+            <a:srgbClr val="106A48">
+              <a:alpha val="21000"/>
+            </a:srgbClr>
+          </a:solidFill>
+          <a:ln>
+            <a:noFill/>
+          </a:ln>
+        </p:spPr>
+        <p:style>
+          <a:lnRef idx="2">
+            <a:schemeClr val="accent1">
+              <a:shade val="15000"/>
+            </a:schemeClr>
+          </a:lnRef>
+          <a:fillRef idx="1">
+            <a:schemeClr val="accent1"/>
+          </a:fillRef>
+          <a:effectRef idx="0">
+            <a:schemeClr val="accent1"/>
+          </a:effectRef>
+          <a:fontRef idx="minor">
+            <a:schemeClr val="lt1"/>
+          </a:fontRef>
+        </p:style>
+        <p:txBody>
+          <a:bodyPr rtlCol="0" anchor="ctr"/>
+          <a:lstStyle/>
+          <a:p>
+            <a:pPr algn="ctr"/>
+            <a:r>
+              <a:rPr lang="en-US" dirty="0">
+                <a:solidFill>
+                  <a:schemeClr val="tx1"/>
+                </a:solidFill>
+                <a:latin typeface="Times" pitchFamily="2" charset="0"/>
+                <a:ea typeface="Noteworthy Light" panose="02000400000000000000" pitchFamily="2" charset="77"/>
+                <a:cs typeface="Kohinoor Bangla" panose="02000000000000000000" pitchFamily="2" charset="77"/>
+              </a:rPr>
+              <a:t>Bangladeshi Community Association of Saskatchewan</a:t>
+            </a:r>
+          </a:p>
+          <a:p>
+            <a:pPr algn="ctr"/>
+            <a:r>
+              <a:rPr lang="en-US" dirty="0" err="1">
+                <a:solidFill>
+                  <a:schemeClr val="tx1"/>
+                </a:solidFill>
+                <a:latin typeface="SolaimanLipi" panose="03000600000000000000" pitchFamily="66" charset="0"/>
+                <a:ea typeface="Noteworthy Light" panose="02000400000000000000" pitchFamily="2" charset="77"/>
+                <a:cs typeface="SolaimanLipi" panose="03000600000000000000" pitchFamily="66" charset="0"/>
+              </a:rPr>
+              <a:t>বাংলাদেশী</a:t>
+            </a:r>
+            <a:r>
+              <a:rPr lang="bn-IN" dirty="0">
+                <a:solidFill>
+                  <a:schemeClr val="tx1"/>
+                </a:solidFill>
+                <a:latin typeface="SolaimanLipi" panose="03000600000000000000" pitchFamily="66" charset="0"/>
+                <a:ea typeface="Noteworthy Light" panose="02000400000000000000" pitchFamily="2" charset="77"/>
+                <a:cs typeface="SolaimanLipi" panose="03000600000000000000" pitchFamily="66" charset="0"/>
+              </a:rPr>
+              <a:t> কমিউনিটি এ্যসোসিয়েশন অব সাসকাচুয়ান</a:t>
+            </a:r>
+            <a:endParaRPr lang="en-US" dirty="0">
+              <a:solidFill>
+                <a:schemeClr val="tx1"/>
+              </a:solidFill>
+              <a:latin typeface="SolaimanLipi" panose="03000600000000000000" pitchFamily="66" charset="0"/>
+              <a:ea typeface="Noteworthy Light" panose="02000400000000000000" pitchFamily="2" charset="77"/>
+              <a:cs typeface="SolaimanLipi" panose="03000600000000000000" pitchFamily="66" charset="0"/>
+            </a:endParaRPr>
+          </a:p>
+        </p:txBody>
+      </p:sp>
+      <p:pic>
+        <p:nvPicPr>
+          <p:cNvPr id="14" name="Picture 13" descr="A flag and flowers with a yellow border&#10;&#10;Description automatically generated">
+            <a:extLst>
+              <a:ext uri="{FF2B5EF4-FFF2-40B4-BE49-F238E27FC236}">
+                <a16:creationId xmlns:a16="http://schemas.microsoft.com/office/drawing/2014/main" id="{0D8E6531-6D1E-0199-0806-AD11A62B73A0}"/>
+              </a:ext>
+            </a:extLst>
+          </p:cNvPr>
+          <p:cNvPicPr>
+            <a:picLocks noChangeAspect="1"/>
+          </p:cNvPicPr>
+          <p:nvPr/>
+        </p:nvPicPr>
+        <p:blipFill>
+          <a:blip r:embed="rId7"/>
+          <a:stretch>
+            <a:fillRect/>
+          </a:stretch>
+        </p:blipFill>
+        <p:spPr>
+          <a:xfrm>
+            <a:off x="90849" y="220146"/>
+            <a:ext cx="770045" cy="433930"/>
+          </a:xfrm>
+          <a:prstGeom prst="rect">
+            <a:avLst/>
+          </a:prstGeom>
+        </p:spPr>
+      </p:pic>
+      <p:pic>
+        <p:nvPicPr>
+          <p:cNvPr id="15" name="Picture 14" descr="A green and red letters on a black background&#10;&#10;Description automatically generated">
+            <a:extLst>
+              <a:ext uri="{FF2B5EF4-FFF2-40B4-BE49-F238E27FC236}">
+                <a16:creationId xmlns:a16="http://schemas.microsoft.com/office/drawing/2014/main" id="{83BE571E-B043-CDC2-5B9F-E360BB605522}"/>
+              </a:ext>
+            </a:extLst>
+          </p:cNvPr>
+          <p:cNvPicPr>
+            <a:picLocks noChangeAspect="1"/>
+          </p:cNvPicPr>
+          <p:nvPr/>
+        </p:nvPicPr>
+        <p:blipFill>
+          <a:blip r:embed="rId8"/>
+          <a:stretch>
+            <a:fillRect/>
+          </a:stretch>
+        </p:blipFill>
+        <p:spPr>
+          <a:xfrm>
+            <a:off x="5976341" y="263399"/>
+            <a:ext cx="946528" cy="438208"/>
+          </a:xfrm>
+          <a:prstGeom prst="rect">
+            <a:avLst/>
+          </a:prstGeom>
+        </p:spPr>
+      </p:pic>
+    </p:spTree>
+    <p:extLst>
+      <p:ext uri="{BB962C8B-B14F-4D97-AF65-F5344CB8AC3E}">
+        <p14:creationId xmlns:p14="http://schemas.microsoft.com/office/powerpoint/2010/main" val="211762900"/>
+      </p:ext>
+    </p:extLst>
+  </p:cSld>
+  <p:clrMapOvr>
+    <a:masterClrMapping/>
+  </p:clrMapOvr>
+</p:sld>
+</file>
+
+<file path=ppt/slides/slide7.xml><?xml version="1.0" encoding="utf-8"?>
 <p:sld xmlns:a="http://schemas.openxmlformats.org/drawingml/2006/main" xmlns:r="http://schemas.openxmlformats.org/officeDocument/2006/relationships" xmlns:p="http://schemas.openxmlformats.org/presentationml/2006/main">
   <p:cSld>
     <p:bg>
@@ -4236,7 +6609,7 @@
                   <a:schemeClr val="bg1"/>
                 </a:solidFill>
               </a:rPr>
-              <a:t>Saturday, 16 Dec, 2023 @5:30 PM</a:t>
+              <a:t>Sunday, 17 Dec, 2023 @5:30 PM</a:t>
             </a:r>
           </a:p>
         </p:txBody>
@@ -4296,7 +6669,23 @@
                   <a:srgbClr val="002060"/>
                 </a:solidFill>
               </a:rPr>
-              <a:t>Mayfair United Church, 902 33rd St W, Saskatoon, SK S7L 0W6</a:t>
+              <a:t>St. Paul’s United Church, 454 </a:t>
+            </a:r>
+            <a:r>
+              <a:rPr lang="en-US" sz="2000">
+                <a:solidFill>
+                  <a:srgbClr val="002060"/>
+                </a:solidFill>
+              </a:rPr>
+              <a:t>Egbert Ave, Saskatoon</a:t>
+            </a:r>
+            <a:r>
+              <a:rPr lang="en-US" sz="2000" dirty="0">
+                <a:solidFill>
+                  <a:srgbClr val="002060"/>
+                </a:solidFill>
+              </a:rPr>
+              <a:t>, SK S7N 1X3</a:t>
             </a:r>
           </a:p>
         </p:txBody>
@@ -5209,7 +7598,7 @@
 </p:sld>
 </file>
 
-<file path=ppt/slides/slide5.xml><?xml version="1.0" encoding="utf-8"?>
+<file path=ppt/slides/slide8.xml><?xml version="1.0" encoding="utf-8"?>
 <p:sld xmlns:a="http://schemas.openxmlformats.org/drawingml/2006/main" xmlns:r="http://schemas.openxmlformats.org/officeDocument/2006/relationships" xmlns:p="http://schemas.openxmlformats.org/presentationml/2006/main">
   <p:cSld>
     <p:bg>
@@ -5275,8 +7664,8 @@
         </p:blipFill>
         <p:spPr>
           <a:xfrm>
-            <a:off x="1332" y="836399"/>
-            <a:ext cx="6874565" cy="6874565"/>
+            <a:off x="-155451" y="860293"/>
+            <a:ext cx="7079689" cy="7079689"/>
           </a:xfrm>
         </p:spPr>
       </p:pic>
@@ -5294,8 +7683,8 @@
         </p:nvSpPr>
         <p:spPr>
           <a:xfrm>
-            <a:off x="3428509" y="2645025"/>
-            <a:ext cx="3431759" cy="470928"/>
+            <a:off x="0" y="6582416"/>
+            <a:ext cx="6922869" cy="470928"/>
           </a:xfrm>
           <a:prstGeom prst="roundRect">
             <a:avLst>
@@ -5303,9 +7692,7 @@
             </a:avLst>
           </a:prstGeom>
           <a:solidFill>
-            <a:srgbClr val="354114">
-              <a:alpha val="80000"/>
-            </a:srgbClr>
+            <a:srgbClr val="354114"/>
           </a:solidFill>
           <a:ln>
             <a:noFill/>
@@ -5331,23 +7718,24 @@
           <a:bodyPr rtlCol="0" anchor="ctr"/>
           <a:lstStyle/>
           <a:p>
+            <a:pPr algn="ctr"/>
             <a:r>
               <a:rPr lang="en-US" sz="2400" dirty="0">
                 <a:solidFill>
                   <a:schemeClr val="bg1"/>
                 </a:solidFill>
               </a:rPr>
-              <a:t>Saturday, 16 Dec, 2023</a:t>
-            </a:r>
-          </a:p>
-        </p:txBody>
-      </p:sp>
-      <p:sp>
-        <p:nvSpPr>
-          <p:cNvPr id="17" name="Rounded Rectangle 16">
+              <a:t>Sunday, 17 Dec, 2023 @5:30 PM</a:t>
+            </a:r>
+          </a:p>
+        </p:txBody>
+      </p:sp>
+      <p:sp>
+        <p:nvSpPr>
+          <p:cNvPr id="19" name="Rounded Rectangle 18">
             <a:extLst>
               <a:ext uri="{FF2B5EF4-FFF2-40B4-BE49-F238E27FC236}">
-                <a16:creationId xmlns:a16="http://schemas.microsoft.com/office/drawing/2014/main" id="{0DFCFE03-233C-0B49-25EB-B63F9889916B}"/>
+                <a16:creationId xmlns:a16="http://schemas.microsoft.com/office/drawing/2014/main" id="{EBF53704-F530-652B-F89B-6FC726DCAE3B}"/>
               </a:ext>
             </a:extLst>
           </p:cNvPr>
@@ -5356,8 +7744,8 @@
         </p:nvSpPr>
         <p:spPr>
           <a:xfrm>
-            <a:off x="3428509" y="3201300"/>
-            <a:ext cx="3431759" cy="497712"/>
+            <a:off x="0" y="7053344"/>
+            <a:ext cx="6987743" cy="619418"/>
           </a:xfrm>
           <a:prstGeom prst="roundRect">
             <a:avLst>
@@ -5365,9 +7753,7 @@
             </a:avLst>
           </a:prstGeom>
           <a:solidFill>
-            <a:srgbClr val="354114">
-              <a:alpha val="80000"/>
-            </a:srgbClr>
+            <a:srgbClr val="E9E8DF"/>
           </a:solidFill>
           <a:ln>
             <a:noFill/>
@@ -5394,22 +7780,52 @@
           <a:lstStyle/>
           <a:p>
             <a:r>
-              <a:rPr lang="en-US" sz="2400" dirty="0">
-                <a:solidFill>
-                  <a:schemeClr val="bg1"/>
-                </a:solidFill>
-              </a:rPr>
-              <a:t>5:30 PM</a:t>
-            </a:r>
-          </a:p>
-        </p:txBody>
-      </p:sp>
-      <p:sp>
-        <p:nvSpPr>
-          <p:cNvPr id="19" name="Rounded Rectangle 18">
+              <a:rPr lang="en-US" sz="2000" dirty="0">
+                <a:solidFill>
+                  <a:srgbClr val="002060"/>
+                </a:solidFill>
+              </a:rPr>
+              <a:t>St. Paul’s United Church, 454 Egbert Ave, Saskatoon, SK S7N 1X3</a:t>
+            </a:r>
+          </a:p>
+        </p:txBody>
+      </p:sp>
+      <p:pic>
+        <p:nvPicPr>
+          <p:cNvPr id="20" name="Picture 19" descr="A green and red letters on a black background&#10;&#10;Description automatically generated">
             <a:extLst>
               <a:ext uri="{FF2B5EF4-FFF2-40B4-BE49-F238E27FC236}">
-                <a16:creationId xmlns:a16="http://schemas.microsoft.com/office/drawing/2014/main" id="{EBF53704-F530-652B-F89B-6FC726DCAE3B}"/>
+                <a16:creationId xmlns:a16="http://schemas.microsoft.com/office/drawing/2014/main" id="{2E970466-A6FA-1E5F-6EA0-5E479DF4CEA8}"/>
+              </a:ext>
+            </a:extLst>
+          </p:cNvPr>
+          <p:cNvPicPr>
+            <a:picLocks noChangeAspect="1"/>
+          </p:cNvPicPr>
+          <p:nvPr/>
+        </p:nvPicPr>
+        <p:blipFill>
+          <a:blip r:embed="rId3"/>
+          <a:stretch>
+            <a:fillRect/>
+          </a:stretch>
+        </p:blipFill>
+        <p:spPr>
+          <a:xfrm>
+            <a:off x="5761062" y="520835"/>
+            <a:ext cx="918295" cy="425137"/>
+          </a:xfrm>
+          <a:prstGeom prst="rect">
+            <a:avLst/>
+          </a:prstGeom>
+        </p:spPr>
+      </p:pic>
+      <p:sp>
+        <p:nvSpPr>
+          <p:cNvPr id="6" name="Oval 5">
+            <a:extLst>
+              <a:ext uri="{FF2B5EF4-FFF2-40B4-BE49-F238E27FC236}">
+                <a16:creationId xmlns:a16="http://schemas.microsoft.com/office/drawing/2014/main" id="{035096B2-6749-383F-9F80-2A062717A727}"/>
               </a:ext>
             </a:extLst>
           </p:cNvPr>
@@ -5417,20 +7833,14 @@
           <p:nvPr/>
         </p:nvSpPr>
         <p:spPr>
-          <a:xfrm>
-            <a:off x="3428509" y="1458839"/>
-            <a:ext cx="3431759" cy="1034674"/>
-          </a:xfrm>
-          <a:prstGeom prst="roundRect">
-            <a:avLst>
-              <a:gd name="adj" fmla="val 0"/>
-            </a:avLst>
+          <a:xfrm rot="20228037">
+            <a:off x="-272064" y="68919"/>
+            <a:ext cx="2982701" cy="2847534"/>
+          </a:xfrm>
+          <a:prstGeom prst="ellipse">
+            <a:avLst/>
           </a:prstGeom>
-          <a:solidFill>
-            <a:srgbClr val="354114">
-              <a:alpha val="80000"/>
-            </a:srgbClr>
-          </a:solidFill>
+          <a:noFill/>
           <a:ln>
             <a:noFill/>
           </a:ln>
@@ -5455,207 +7865,26 @@
           <a:bodyPr rtlCol="0" anchor="ctr"/>
           <a:lstStyle/>
           <a:p>
-            <a:r>
-              <a:rPr lang="en-US" sz="2400" dirty="0"/>
-              <a:t>Mayfair United Church</a:t>
-            </a:r>
-          </a:p>
-          <a:p>
-            <a:r>
-              <a:rPr lang="en-US" sz="2400" dirty="0"/>
-              <a:t>902 33rd St W, </a:t>
-            </a:r>
-          </a:p>
-          <a:p>
-            <a:r>
-              <a:rPr lang="en-US" sz="2400" dirty="0"/>
-              <a:t>Saskatoon, SK S7L 0W6</a:t>
-            </a:r>
-            <a:endParaRPr lang="en-US" sz="2400" dirty="0">
-              <a:solidFill>
-                <a:schemeClr val="bg1"/>
-              </a:solidFill>
-            </a:endParaRPr>
-          </a:p>
-        </p:txBody>
-      </p:sp>
-      <p:pic>
-        <p:nvPicPr>
-          <p:cNvPr id="20" name="Picture 19" descr="A green and red letters on a black background&#10;&#10;Description automatically generated">
+            <a:pPr algn="ctr"/>
+            <a:r>
+              <a:rPr lang="en-US" sz="12000" dirty="0">
+                <a:solidFill>
+                  <a:srgbClr val="FF0000"/>
+                </a:solidFill>
+                <a:latin typeface="Li Alinur Prottoyoee Unicode" panose="02000500000000000000" pitchFamily="2" charset="0"/>
+                <a:cs typeface="Li Alinur Prottoyoee Unicode" panose="02000500000000000000" pitchFamily="2" charset="0"/>
+              </a:rPr>
+              <a:t>১৬</a:t>
+            </a:r>
+          </a:p>
+        </p:txBody>
+      </p:sp>
+      <p:sp>
+        <p:nvSpPr>
+          <p:cNvPr id="7" name="Rectangle 6">
             <a:extLst>
               <a:ext uri="{FF2B5EF4-FFF2-40B4-BE49-F238E27FC236}">
-                <a16:creationId xmlns:a16="http://schemas.microsoft.com/office/drawing/2014/main" id="{2E970466-A6FA-1E5F-6EA0-5E479DF4CEA8}"/>
-              </a:ext>
-            </a:extLst>
-          </p:cNvPr>
-          <p:cNvPicPr>
-            <a:picLocks noChangeAspect="1"/>
-          </p:cNvPicPr>
-          <p:nvPr/>
-        </p:nvPicPr>
-        <p:blipFill>
-          <a:blip r:embed="rId3"/>
-          <a:stretch>
-            <a:fillRect/>
-          </a:stretch>
-        </p:blipFill>
-        <p:spPr>
-          <a:xfrm>
-            <a:off x="4067309" y="30020"/>
-            <a:ext cx="2572278" cy="1190870"/>
-          </a:xfrm>
-          <a:prstGeom prst="rect">
-            <a:avLst/>
-          </a:prstGeom>
-        </p:spPr>
-      </p:pic>
-      <p:pic>
-        <p:nvPicPr>
-          <p:cNvPr id="18" name="Picture 8" descr="Location - Free maps and location icons">
-            <a:extLst>
-              <a:ext uri="{FF2B5EF4-FFF2-40B4-BE49-F238E27FC236}">
-                <a16:creationId xmlns:a16="http://schemas.microsoft.com/office/drawing/2014/main" id="{8BC6FF62-E6D9-80F5-BB21-14FFCDEBF948}"/>
-              </a:ext>
-            </a:extLst>
-          </p:cNvPr>
-          <p:cNvPicPr>
-            <a:picLocks noChangeAspect="1" noChangeArrowheads="1"/>
-          </p:cNvPicPr>
-          <p:nvPr/>
-        </p:nvPicPr>
-        <p:blipFill>
-          <a:blip r:embed="rId4">
-            <a:extLst>
-              <a:ext uri="{28A0092B-C50C-407E-A947-70E740481C1C}">
-                <a14:useLocalDpi xmlns:a14="http://schemas.microsoft.com/office/drawing/2010/main" val="0"/>
-              </a:ext>
-            </a:extLst>
-          </a:blip>
-          <a:srcRect/>
-          <a:stretch>
-            <a:fillRect/>
-          </a:stretch>
-        </p:blipFill>
-        <p:spPr bwMode="auto">
-          <a:xfrm>
-            <a:off x="6221005" y="1659172"/>
-            <a:ext cx="619418" cy="619418"/>
-          </a:xfrm>
-          <a:prstGeom prst="rect">
-            <a:avLst/>
-          </a:prstGeom>
-          <a:noFill/>
-          <a:extLst>
-            <a:ext uri="{909E8E84-426E-40DD-AFC4-6F175D3DCCD1}">
-              <a14:hiddenFill xmlns:a14="http://schemas.microsoft.com/office/drawing/2010/main">
-                <a:solidFill>
-                  <a:srgbClr val="FFFFFF"/>
-                </a:solidFill>
-              </a14:hiddenFill>
-            </a:ext>
-          </a:extLst>
-        </p:spPr>
-      </p:pic>
-      <p:pic>
-        <p:nvPicPr>
-          <p:cNvPr id="15" name="Picture 2" descr="Calendar icon - Free download on Iconfinder">
-            <a:extLst>
-              <a:ext uri="{FF2B5EF4-FFF2-40B4-BE49-F238E27FC236}">
-                <a16:creationId xmlns:a16="http://schemas.microsoft.com/office/drawing/2014/main" id="{917B0C02-992F-1A04-E72B-CFAA56C9CF44}"/>
-              </a:ext>
-            </a:extLst>
-          </p:cNvPr>
-          <p:cNvPicPr>
-            <a:picLocks noChangeAspect="1" noChangeArrowheads="1"/>
-          </p:cNvPicPr>
-          <p:nvPr/>
-        </p:nvPicPr>
-        <p:blipFill>
-          <a:blip r:embed="rId5">
-            <a:extLst>
-              <a:ext uri="{28A0092B-C50C-407E-A947-70E740481C1C}">
-                <a14:useLocalDpi xmlns:a14="http://schemas.microsoft.com/office/drawing/2010/main" val="0"/>
-              </a:ext>
-            </a:extLst>
-          </a:blip>
-          <a:srcRect/>
-          <a:stretch>
-            <a:fillRect/>
-          </a:stretch>
-        </p:blipFill>
-        <p:spPr bwMode="auto">
-          <a:xfrm>
-            <a:off x="6348631" y="2656687"/>
-            <a:ext cx="473132" cy="473132"/>
-          </a:xfrm>
-          <a:prstGeom prst="rect">
-            <a:avLst/>
-          </a:prstGeom>
-          <a:noFill/>
-          <a:extLst>
-            <a:ext uri="{909E8E84-426E-40DD-AFC4-6F175D3DCCD1}">
-              <a14:hiddenFill xmlns:a14="http://schemas.microsoft.com/office/drawing/2010/main">
-                <a:solidFill>
-                  <a:srgbClr val="FFFFFF"/>
-                </a:solidFill>
-              </a14:hiddenFill>
-            </a:ext>
-          </a:extLst>
-        </p:spPr>
-      </p:pic>
-      <p:pic>
-        <p:nvPicPr>
-          <p:cNvPr id="16" name="Picture 2" descr="Time Clock icon sign design 9341969 PNG">
-            <a:extLst>
-              <a:ext uri="{FF2B5EF4-FFF2-40B4-BE49-F238E27FC236}">
-                <a16:creationId xmlns:a16="http://schemas.microsoft.com/office/drawing/2014/main" id="{21E9DA96-3CAD-0DE9-DB1E-BC5C11CF9A44}"/>
-              </a:ext>
-            </a:extLst>
-          </p:cNvPr>
-          <p:cNvPicPr>
-            <a:picLocks noChangeAspect="1" noChangeArrowheads="1"/>
-          </p:cNvPicPr>
-          <p:nvPr/>
-        </p:nvPicPr>
-        <p:blipFill>
-          <a:blip r:embed="rId6">
-            <a:extLst>
-              <a:ext uri="{28A0092B-C50C-407E-A947-70E740481C1C}">
-                <a14:useLocalDpi xmlns:a14="http://schemas.microsoft.com/office/drawing/2010/main" val="0"/>
-              </a:ext>
-            </a:extLst>
-          </a:blip>
-          <a:srcRect/>
-          <a:stretch>
-            <a:fillRect/>
-          </a:stretch>
-        </p:blipFill>
-        <p:spPr bwMode="auto">
-          <a:xfrm>
-            <a:off x="6348631" y="3236401"/>
-            <a:ext cx="381557" cy="389860"/>
-          </a:xfrm>
-          <a:prstGeom prst="rect">
-            <a:avLst/>
-          </a:prstGeom>
-          <a:noFill/>
-          <a:extLst>
-            <a:ext uri="{909E8E84-426E-40DD-AFC4-6F175D3DCCD1}">
-              <a14:hiddenFill xmlns:a14="http://schemas.microsoft.com/office/drawing/2010/main">
-                <a:solidFill>
-                  <a:srgbClr val="FFFFFF"/>
-                </a:solidFill>
-              </a14:hiddenFill>
-            </a:ext>
-          </a:extLst>
-        </p:spPr>
-      </p:pic>
-      <p:sp>
-        <p:nvSpPr>
-          <p:cNvPr id="6" name="Oval 5">
-            <a:extLst>
-              <a:ext uri="{FF2B5EF4-FFF2-40B4-BE49-F238E27FC236}">
-                <a16:creationId xmlns:a16="http://schemas.microsoft.com/office/drawing/2014/main" id="{035096B2-6749-383F-9F80-2A062717A727}"/>
+                <a16:creationId xmlns:a16="http://schemas.microsoft.com/office/drawing/2014/main" id="{69C40BCA-4D4A-D6F4-EAA8-901C45BC323D}"/>
               </a:ext>
             </a:extLst>
           </p:cNvPr>
@@ -5663,11 +7892,11 @@
           <p:nvPr/>
         </p:nvSpPr>
         <p:spPr>
-          <a:xfrm>
-            <a:off x="-545365" y="-592925"/>
-            <a:ext cx="2982701" cy="2847534"/>
-          </a:xfrm>
-          <a:prstGeom prst="ellipse">
+          <a:xfrm rot="20226102">
+            <a:off x="-59041" y="1918751"/>
+            <a:ext cx="2982701" cy="914400"/>
+          </a:xfrm>
+          <a:prstGeom prst="rect">
             <a:avLst/>
           </a:prstGeom>
           <a:noFill/>
@@ -5697,24 +7926,36 @@
           <a:p>
             <a:pPr algn="ctr"/>
             <a:r>
-              <a:rPr lang="en-US" sz="12000" dirty="0">
+              <a:rPr lang="en-CA" sz="6000" b="1" dirty="0" err="1">
+                <a:solidFill>
+                  <a:srgbClr val="106A48"/>
+                </a:solidFill>
+                <a:latin typeface="Matura MT Script Capitals" panose="03020802060602070202" pitchFamily="66" charset="0"/>
+                <a:ea typeface="Meiryo" panose="020B0400000000000000" pitchFamily="34" charset="-128"/>
+                <a:cs typeface="Li Alinur Akorshon Unicode" panose="02000500000000000000" pitchFamily="2" charset="0"/>
+              </a:rPr>
+              <a:t>ডিসেম্বর</a:t>
+            </a:r>
+            <a:r>
+              <a:rPr lang="en-CA" sz="6000" dirty="0">
                 <a:solidFill>
                   <a:srgbClr val="FF0000"/>
                 </a:solidFill>
-                <a:latin typeface="Li Alinur Prottoyoee Unicode" panose="02000500000000000000" pitchFamily="2" charset="0"/>
-                <a:cs typeface="Li Alinur Prottoyoee Unicode" panose="02000500000000000000" pitchFamily="2" charset="0"/>
-              </a:rPr>
-              <a:t>১৬</a:t>
-            </a:r>
-          </a:p>
-        </p:txBody>
-      </p:sp>
-      <p:sp>
-        <p:nvSpPr>
-          <p:cNvPr id="7" name="Rectangle 6">
+                <a:latin typeface="Matura MT Script Capitals" panose="03020802060602070202" pitchFamily="66" charset="0"/>
+                <a:ea typeface="Meiryo" panose="020B0400000000000000" pitchFamily="34" charset="-128"/>
+                <a:cs typeface="Li Alinur Akorshon Unicode" panose="02000500000000000000" pitchFamily="2" charset="0"/>
+              </a:rPr>
+              <a:t> </a:t>
+            </a:r>
+          </a:p>
+        </p:txBody>
+      </p:sp>
+      <p:sp>
+        <p:nvSpPr>
+          <p:cNvPr id="9" name="Rectangle 8">
             <a:extLst>
               <a:ext uri="{FF2B5EF4-FFF2-40B4-BE49-F238E27FC236}">
-                <a16:creationId xmlns:a16="http://schemas.microsoft.com/office/drawing/2014/main" id="{69C40BCA-4D4A-D6F4-EAA8-901C45BC323D}"/>
+                <a16:creationId xmlns:a16="http://schemas.microsoft.com/office/drawing/2014/main" id="{40E20550-AB8E-91DA-D4B8-41FBA834C3DE}"/>
               </a:ext>
             </a:extLst>
           </p:cNvPr>
@@ -5722,9 +7963,9 @@
           <p:nvPr/>
         </p:nvSpPr>
         <p:spPr>
-          <a:xfrm rot="20226102">
-            <a:off x="228356" y="1079138"/>
-            <a:ext cx="2982701" cy="914400"/>
+          <a:xfrm rot="20318689">
+            <a:off x="-95633" y="2868856"/>
+            <a:ext cx="3964986" cy="1514188"/>
           </a:xfrm>
           <a:prstGeom prst="rect">
             <a:avLst/>
@@ -5756,24 +7997,24 @@
           <a:p>
             <a:pPr algn="ctr"/>
             <a:r>
-              <a:rPr lang="en-CA" sz="6000" b="1" dirty="0" err="1">
-                <a:solidFill>
-                  <a:srgbClr val="106A48"/>
-                </a:solidFill>
-                <a:latin typeface="Matura MT Script Capitals" panose="03020802060602070202" pitchFamily="66" charset="0"/>
+              <a:rPr lang="en-CA" sz="10000" dirty="0" err="1">
+                <a:solidFill>
+                  <a:schemeClr val="tx1"/>
+                </a:solidFill>
+                <a:latin typeface="Li Alinur Prottoyoee Unicode" panose="02000500000000000000" pitchFamily="2" charset="0"/>
                 <a:ea typeface="Meiryo" panose="020B0400000000000000" pitchFamily="34" charset="-128"/>
-                <a:cs typeface="Li Alinur Akorshon Unicode" panose="02000500000000000000" pitchFamily="2" charset="0"/>
-              </a:rPr>
-              <a:t>ডিসেম্বর</a:t>
-            </a:r>
-            <a:r>
-              <a:rPr lang="en-CA" sz="6000" dirty="0">
-                <a:solidFill>
-                  <a:srgbClr val="FF0000"/>
-                </a:solidFill>
-                <a:latin typeface="Matura MT Script Capitals" panose="03020802060602070202" pitchFamily="66" charset="0"/>
+                <a:cs typeface="Li Alinur Prottoyoee Unicode" panose="02000500000000000000" pitchFamily="2" charset="0"/>
+              </a:rPr>
+              <a:t>বিজয়</a:t>
+            </a:r>
+            <a:r>
+              <a:rPr lang="en-CA" sz="10000" dirty="0">
+                <a:solidFill>
+                  <a:schemeClr val="bg1"/>
+                </a:solidFill>
+                <a:latin typeface="Li Alinur Prottoyoee Unicode" panose="02000500000000000000" pitchFamily="2" charset="0"/>
                 <a:ea typeface="Meiryo" panose="020B0400000000000000" pitchFamily="34" charset="-128"/>
-                <a:cs typeface="Li Alinur Akorshon Unicode" panose="02000500000000000000" pitchFamily="2" charset="0"/>
+                <a:cs typeface="Li Alinur Prottoyoee Unicode" panose="02000500000000000000" pitchFamily="2" charset="0"/>
               </a:rPr>
               <a:t> </a:t>
             </a:r>
@@ -5782,10 +8023,10 @@
       </p:sp>
       <p:sp>
         <p:nvSpPr>
-          <p:cNvPr id="9" name="Rectangle 8">
+          <p:cNvPr id="10" name="Rectangle 9">
             <a:extLst>
               <a:ext uri="{FF2B5EF4-FFF2-40B4-BE49-F238E27FC236}">
-                <a16:creationId xmlns:a16="http://schemas.microsoft.com/office/drawing/2014/main" id="{40E20550-AB8E-91DA-D4B8-41FBA834C3DE}"/>
+                <a16:creationId xmlns:a16="http://schemas.microsoft.com/office/drawing/2014/main" id="{268D3994-2FDC-0C28-FDBB-8FC5A9AF4E32}"/>
               </a:ext>
             </a:extLst>
           </p:cNvPr>
@@ -5793,9 +8034,9 @@
           <p:nvPr/>
         </p:nvSpPr>
         <p:spPr>
-          <a:xfrm rot="20318689">
-            <a:off x="-393656" y="2238441"/>
-            <a:ext cx="3964986" cy="1514188"/>
+          <a:xfrm rot="20435980">
+            <a:off x="952482" y="3799028"/>
+            <a:ext cx="2982701" cy="914400"/>
           </a:xfrm>
           <a:prstGeom prst="rect">
             <a:avLst/>
@@ -5827,24 +8068,24 @@
           <a:p>
             <a:pPr algn="ctr"/>
             <a:r>
-              <a:rPr lang="en-CA" sz="10000" dirty="0" err="1">
-                <a:solidFill>
-                  <a:schemeClr val="tx1"/>
-                </a:solidFill>
-                <a:latin typeface="Li Alinur Prottoyoee Unicode" panose="02000500000000000000" pitchFamily="2" charset="0"/>
+              <a:rPr lang="en-CA" sz="6000" dirty="0" err="1">
+                <a:solidFill>
+                  <a:schemeClr val="bg1"/>
+                </a:solidFill>
+                <a:latin typeface="Matura MT Script Capitals" panose="03020802060602070202" pitchFamily="66" charset="0"/>
                 <a:ea typeface="Meiryo" panose="020B0400000000000000" pitchFamily="34" charset="-128"/>
-                <a:cs typeface="Li Alinur Prottoyoee Unicode" panose="02000500000000000000" pitchFamily="2" charset="0"/>
-              </a:rPr>
-              <a:t>বিজয়</a:t>
-            </a:r>
-            <a:r>
-              <a:rPr lang="en-CA" sz="10000" dirty="0">
-                <a:solidFill>
-                  <a:schemeClr val="bg1"/>
-                </a:solidFill>
-                <a:latin typeface="Li Alinur Prottoyoee Unicode" panose="02000500000000000000" pitchFamily="2" charset="0"/>
+                <a:cs typeface="Li Alinur Akorshon Unicode" panose="02000500000000000000" pitchFamily="2" charset="0"/>
+              </a:rPr>
+              <a:t>দিবস</a:t>
+            </a:r>
+            <a:r>
+              <a:rPr lang="en-CA" sz="6000" dirty="0">
+                <a:solidFill>
+                  <a:schemeClr val="bg1"/>
+                </a:solidFill>
+                <a:latin typeface="Matura MT Script Capitals" panose="03020802060602070202" pitchFamily="66" charset="0"/>
                 <a:ea typeface="Meiryo" panose="020B0400000000000000" pitchFamily="34" charset="-128"/>
-                <a:cs typeface="Li Alinur Prottoyoee Unicode" panose="02000500000000000000" pitchFamily="2" charset="0"/>
+                <a:cs typeface="Li Alinur Akorshon Unicode" panose="02000500000000000000" pitchFamily="2" charset="0"/>
               </a:rPr>
               <a:t> </a:t>
             </a:r>
@@ -5853,10 +8094,10 @@
       </p:sp>
       <p:sp>
         <p:nvSpPr>
-          <p:cNvPr id="10" name="Rectangle 9">
+          <p:cNvPr id="8" name="Rectangle 7">
             <a:extLst>
               <a:ext uri="{FF2B5EF4-FFF2-40B4-BE49-F238E27FC236}">
-                <a16:creationId xmlns:a16="http://schemas.microsoft.com/office/drawing/2014/main" id="{268D3994-2FDC-0C28-FDBB-8FC5A9AF4E32}"/>
+                <a16:creationId xmlns:a16="http://schemas.microsoft.com/office/drawing/2014/main" id="{0C8F9C0E-EAA6-9942-0867-CFF669E54979}"/>
               </a:ext>
             </a:extLst>
           </p:cNvPr>
@@ -5864,8 +8105,8 @@
           <p:nvPr/>
         </p:nvSpPr>
         <p:spPr>
-          <a:xfrm rot="20435980">
-            <a:off x="506398" y="3285951"/>
+          <a:xfrm rot="20511714">
+            <a:off x="286712" y="2440264"/>
             <a:ext cx="2982701" cy="914400"/>
           </a:xfrm>
           <a:prstGeom prst="rect">
@@ -5900,18 +8141,18 @@
             <a:r>
               <a:rPr lang="en-CA" sz="6000" dirty="0" err="1">
                 <a:solidFill>
-                  <a:schemeClr val="bg1"/>
+                  <a:schemeClr val="tx1"/>
                 </a:solidFill>
                 <a:latin typeface="Matura MT Script Capitals" panose="03020802060602070202" pitchFamily="66" charset="0"/>
                 <a:ea typeface="Meiryo" panose="020B0400000000000000" pitchFamily="34" charset="-128"/>
                 <a:cs typeface="Li Alinur Akorshon Unicode" panose="02000500000000000000" pitchFamily="2" charset="0"/>
               </a:rPr>
-              <a:t>দিবস</a:t>
+              <a:t>মহান</a:t>
             </a:r>
             <a:r>
               <a:rPr lang="en-CA" sz="6000" dirty="0">
                 <a:solidFill>
-                  <a:schemeClr val="bg1"/>
+                  <a:schemeClr val="tx1"/>
                 </a:solidFill>
                 <a:latin typeface="Matura MT Script Capitals" panose="03020802060602070202" pitchFamily="66" charset="0"/>
                 <a:ea typeface="Meiryo" panose="020B0400000000000000" pitchFamily="34" charset="-128"/>
@@ -5924,10 +8165,266 @@
       </p:sp>
       <p:sp>
         <p:nvSpPr>
-          <p:cNvPr id="8" name="Rectangle 7">
+          <p:cNvPr id="11" name="TextBox 10">
             <a:extLst>
               <a:ext uri="{FF2B5EF4-FFF2-40B4-BE49-F238E27FC236}">
-                <a16:creationId xmlns:a16="http://schemas.microsoft.com/office/drawing/2014/main" id="{0C8F9C0E-EAA6-9942-0867-CFF669E54979}"/>
+                <a16:creationId xmlns:a16="http://schemas.microsoft.com/office/drawing/2014/main" id="{12E9AA2F-B848-E071-4F68-B11B54D0E64B}"/>
+              </a:ext>
+            </a:extLst>
+          </p:cNvPr>
+          <p:cNvSpPr txBox="1"/>
+          <p:nvPr/>
+        </p:nvSpPr>
+        <p:spPr>
+          <a:xfrm>
+            <a:off x="-64874" y="7670198"/>
+            <a:ext cx="6987743" cy="1477328"/>
+          </a:xfrm>
+          <a:prstGeom prst="rect">
+            <a:avLst/>
+          </a:prstGeom>
+          <a:solidFill>
+            <a:srgbClr val="106A48"/>
+          </a:solidFill>
+        </p:spPr>
+        <p:txBody>
+          <a:bodyPr wrap="square">
+            <a:spAutoFit/>
+          </a:bodyPr>
+          <a:lstStyle/>
+          <a:p>
+            <a:pPr algn="ctr"/>
+            <a:r>
+              <a:rPr lang="en-CA" b="1" i="0" dirty="0">
+                <a:solidFill>
+                  <a:schemeClr val="bg1"/>
+                </a:solidFill>
+                <a:effectLst/>
+                <a:latin typeface="arial" panose="020B0604020202020204" pitchFamily="34" charset="0"/>
+              </a:rPr>
+              <a:t>OUR SPONSORS</a:t>
+            </a:r>
+          </a:p>
+          <a:p>
+            <a:pPr algn="ctr"/>
+            <a:r>
+              <a:rPr lang="en-CA" b="0" i="0" dirty="0">
+                <a:solidFill>
+                  <a:schemeClr val="bg1"/>
+                </a:solidFill>
+                <a:effectLst/>
+                <a:latin typeface="arial" panose="020B0604020202020204" pitchFamily="34" charset="0"/>
+              </a:rPr>
+              <a:t>•</a:t>
+            </a:r>
+            <a:r>
+              <a:rPr lang="en-CA" dirty="0">
+                <a:solidFill>
+                  <a:schemeClr val="bg1"/>
+                </a:solidFill>
+              </a:rPr>
+              <a:t>Priyanka Nandi </a:t>
+            </a:r>
+            <a:r>
+              <a:rPr lang="en-CA" b="0" i="0" dirty="0">
+                <a:solidFill>
+                  <a:schemeClr val="bg1"/>
+                </a:solidFill>
+                <a:effectLst/>
+                <a:latin typeface="arial" panose="020B0604020202020204" pitchFamily="34" charset="0"/>
+              </a:rPr>
+              <a:t>•</a:t>
+            </a:r>
+            <a:r>
+              <a:rPr lang="en-CA" dirty="0">
+                <a:solidFill>
+                  <a:schemeClr val="bg1"/>
+                </a:solidFill>
+              </a:rPr>
+              <a:t>Feroza Financial </a:t>
+            </a:r>
+            <a:r>
+              <a:rPr lang="en-CA" b="0" i="0" dirty="0">
+                <a:solidFill>
+                  <a:schemeClr val="bg1"/>
+                </a:solidFill>
+                <a:effectLst/>
+                <a:latin typeface="arial" panose="020B0604020202020204" pitchFamily="34" charset="0"/>
+              </a:rPr>
+              <a:t>•</a:t>
+            </a:r>
+            <a:r>
+              <a:rPr lang="en-CA" dirty="0">
+                <a:solidFill>
+                  <a:schemeClr val="bg1"/>
+                </a:solidFill>
+              </a:rPr>
+              <a:t>S M Auto Sales Ltd. </a:t>
+            </a:r>
+            <a:r>
+              <a:rPr lang="en-CA" b="0" i="0" dirty="0">
+                <a:solidFill>
+                  <a:schemeClr val="bg1"/>
+                </a:solidFill>
+                <a:effectLst/>
+                <a:latin typeface="arial" panose="020B0604020202020204" pitchFamily="34" charset="0"/>
+              </a:rPr>
+              <a:t>•</a:t>
+            </a:r>
+            <a:r>
+              <a:rPr lang="en-CA" dirty="0">
+                <a:solidFill>
+                  <a:schemeClr val="bg1"/>
+                </a:solidFill>
+              </a:rPr>
+              <a:t>Popular Auto </a:t>
+            </a:r>
+          </a:p>
+          <a:p>
+            <a:pPr algn="ctr"/>
+            <a:r>
+              <a:rPr lang="en-CA" b="0" i="0" dirty="0">
+                <a:solidFill>
+                  <a:schemeClr val="bg1"/>
+                </a:solidFill>
+                <a:effectLst/>
+                <a:latin typeface="arial" panose="020B0604020202020204" pitchFamily="34" charset="0"/>
+              </a:rPr>
+              <a:t>•</a:t>
+            </a:r>
+            <a:r>
+              <a:rPr lang="en-CA" dirty="0">
+                <a:solidFill>
+                  <a:schemeClr val="bg1"/>
+                </a:solidFill>
+              </a:rPr>
+              <a:t>Sky Motors </a:t>
+            </a:r>
+            <a:r>
+              <a:rPr lang="en-CA" b="0" i="0" dirty="0">
+                <a:solidFill>
+                  <a:schemeClr val="bg1"/>
+                </a:solidFill>
+                <a:effectLst/>
+                <a:latin typeface="arial" panose="020B0604020202020204" pitchFamily="34" charset="0"/>
+              </a:rPr>
+              <a:t>•</a:t>
+            </a:r>
+            <a:r>
+              <a:rPr lang="en-CA" dirty="0">
+                <a:solidFill>
+                  <a:schemeClr val="bg1"/>
+                </a:solidFill>
+              </a:rPr>
+              <a:t>Economy Auto Repair </a:t>
+            </a:r>
+            <a:r>
+              <a:rPr lang="en-CA" b="0" i="0" dirty="0">
+                <a:solidFill>
+                  <a:schemeClr val="bg1"/>
+                </a:solidFill>
+                <a:effectLst/>
+                <a:latin typeface="arial" panose="020B0604020202020204" pitchFamily="34" charset="0"/>
+              </a:rPr>
+              <a:t>•</a:t>
+            </a:r>
+            <a:r>
+              <a:rPr lang="en-CA" dirty="0">
+                <a:solidFill>
+                  <a:schemeClr val="bg1"/>
+                </a:solidFill>
+              </a:rPr>
+              <a:t>Nas-Motive Auto Sales &amp; Services </a:t>
+            </a:r>
+            <a:r>
+              <a:rPr lang="en-CA" b="0" i="0" dirty="0">
+                <a:solidFill>
+                  <a:schemeClr val="bg1"/>
+                </a:solidFill>
+                <a:effectLst/>
+                <a:latin typeface="arial" panose="020B0604020202020204" pitchFamily="34" charset="0"/>
+              </a:rPr>
+              <a:t>•</a:t>
+            </a:r>
+            <a:r>
+              <a:rPr lang="en-CA" dirty="0">
+                <a:solidFill>
+                  <a:schemeClr val="bg1"/>
+                </a:solidFill>
+              </a:rPr>
+              <a:t>Confederation Inn &amp; Suites </a:t>
+            </a:r>
+            <a:r>
+              <a:rPr lang="en-CA" b="0" i="0" dirty="0">
+                <a:solidFill>
+                  <a:schemeClr val="bg1"/>
+                </a:solidFill>
+                <a:effectLst/>
+                <a:latin typeface="arial" panose="020B0604020202020204" pitchFamily="34" charset="0"/>
+              </a:rPr>
+              <a:t>•</a:t>
+            </a:r>
+            <a:r>
+              <a:rPr lang="en-CA" dirty="0">
+                <a:solidFill>
+                  <a:schemeClr val="bg1"/>
+                </a:solidFill>
+              </a:rPr>
+              <a:t>First Choice Supermarket &amp; Halal Meat</a:t>
+            </a:r>
+            <a:r>
+              <a:rPr lang="en-CA" b="0" i="0" dirty="0">
+                <a:solidFill>
+                  <a:schemeClr val="bg1"/>
+                </a:solidFill>
+                <a:effectLst/>
+                <a:latin typeface="arial" panose="020B0604020202020204" pitchFamily="34" charset="0"/>
+              </a:rPr>
+              <a:t> •</a:t>
+            </a:r>
+            <a:r>
+              <a:rPr lang="en-CA" dirty="0" err="1">
+                <a:solidFill>
+                  <a:schemeClr val="bg1"/>
+                </a:solidFill>
+              </a:rPr>
+              <a:t>Beautyleven</a:t>
+            </a:r>
+            <a:r>
+              <a:rPr lang="en-CA" dirty="0">
+                <a:solidFill>
+                  <a:schemeClr val="bg1"/>
+                </a:solidFill>
+              </a:rPr>
+              <a:t> Canada </a:t>
+            </a:r>
+            <a:r>
+              <a:rPr lang="en-CA" b="0" i="0" dirty="0">
+                <a:solidFill>
+                  <a:schemeClr val="bg1"/>
+                </a:solidFill>
+                <a:effectLst/>
+                <a:latin typeface="arial" panose="020B0604020202020204" pitchFamily="34" charset="0"/>
+              </a:rPr>
+              <a:t>•</a:t>
+            </a:r>
+            <a:r>
+              <a:rPr lang="en-CA" dirty="0">
+                <a:solidFill>
+                  <a:schemeClr val="bg1"/>
+                </a:solidFill>
+              </a:rPr>
+              <a:t>Guide Me Immigration</a:t>
+            </a:r>
+          </a:p>
+        </p:txBody>
+      </p:sp>
+      <p:sp>
+        <p:nvSpPr>
+          <p:cNvPr id="4" name="Rectangle 3">
+            <a:extLst>
+              <a:ext uri="{FF2B5EF4-FFF2-40B4-BE49-F238E27FC236}">
+                <a16:creationId xmlns:a16="http://schemas.microsoft.com/office/drawing/2014/main" id="{E1916B8B-3C6A-F5E2-D37E-C76DC36925E2}"/>
               </a:ext>
             </a:extLst>
           </p:cNvPr>
@@ -5935,14 +8432,16 @@
           <p:nvPr/>
         </p:nvSpPr>
         <p:spPr>
-          <a:xfrm rot="20511714">
-            <a:off x="395510" y="1752649"/>
-            <a:ext cx="2982701" cy="914400"/>
+          <a:xfrm>
+            <a:off x="-162010" y="4769805"/>
+            <a:ext cx="4133804" cy="598272"/>
           </a:xfrm>
           <a:prstGeom prst="rect">
             <a:avLst/>
           </a:prstGeom>
-          <a:noFill/>
+          <a:solidFill>
+            <a:srgbClr val="106A48"/>
+          </a:solidFill>
           <a:ln>
             <a:noFill/>
           </a:ln>
@@ -5967,22 +8466,22 @@
           <a:bodyPr rtlCol="0" anchor="ctr"/>
           <a:lstStyle/>
           <a:p>
-            <a:pPr algn="ctr"/>
-            <a:r>
-              <a:rPr lang="en-CA" sz="6000" dirty="0" err="1">
-                <a:solidFill>
-                  <a:schemeClr val="tx1"/>
+            <a:pPr algn="r"/>
+            <a:r>
+              <a:rPr lang="en-CA" sz="3200" b="1" dirty="0" err="1">
+                <a:solidFill>
+                  <a:schemeClr val="bg1"/>
                 </a:solidFill>
                 <a:latin typeface="Matura MT Script Capitals" panose="03020802060602070202" pitchFamily="66" charset="0"/>
                 <a:ea typeface="Meiryo" panose="020B0400000000000000" pitchFamily="34" charset="-128"/>
                 <a:cs typeface="Li Alinur Akorshon Unicode" panose="02000500000000000000" pitchFamily="2" charset="0"/>
               </a:rPr>
-              <a:t>মহান</a:t>
-            </a:r>
-            <a:r>
-              <a:rPr lang="en-CA" sz="6000" dirty="0">
-                <a:solidFill>
-                  <a:schemeClr val="tx1"/>
+              <a:t>মনোজ্ঞ</a:t>
+            </a:r>
+            <a:r>
+              <a:rPr lang="en-CA" sz="3200" b="1" dirty="0">
+                <a:solidFill>
+                  <a:schemeClr val="bg1"/>
                 </a:solidFill>
                 <a:latin typeface="Matura MT Script Capitals" panose="03020802060602070202" pitchFamily="66" charset="0"/>
                 <a:ea typeface="Meiryo" panose="020B0400000000000000" pitchFamily="34" charset="-128"/>
@@ -5990,269 +8489,56 @@
               </a:rPr>
               <a:t> </a:t>
             </a:r>
-          </a:p>
-        </p:txBody>
-      </p:sp>
-      <p:sp>
-        <p:nvSpPr>
-          <p:cNvPr id="11" name="TextBox 10">
+            <a:r>
+              <a:rPr lang="en-CA" sz="3200" b="1" dirty="0" err="1">
+                <a:solidFill>
+                  <a:schemeClr val="bg1"/>
+                </a:solidFill>
+                <a:latin typeface="Matura MT Script Capitals" panose="03020802060602070202" pitchFamily="66" charset="0"/>
+                <a:ea typeface="Meiryo" panose="020B0400000000000000" pitchFamily="34" charset="-128"/>
+                <a:cs typeface="Li Alinur Akorshon Unicode" panose="02000500000000000000" pitchFamily="2" charset="0"/>
+              </a:rPr>
+              <a:t>সাংস্কৃতিক</a:t>
+            </a:r>
+            <a:r>
+              <a:rPr lang="en-CA" sz="3200" b="1" dirty="0">
+                <a:solidFill>
+                  <a:schemeClr val="bg1"/>
+                </a:solidFill>
+                <a:latin typeface="Matura MT Script Capitals" panose="03020802060602070202" pitchFamily="66" charset="0"/>
+                <a:ea typeface="Meiryo" panose="020B0400000000000000" pitchFamily="34" charset="-128"/>
+                <a:cs typeface="Li Alinur Akorshon Unicode" panose="02000500000000000000" pitchFamily="2" charset="0"/>
+              </a:rPr>
+              <a:t> </a:t>
+            </a:r>
+            <a:r>
+              <a:rPr lang="en-CA" sz="3200" b="1" dirty="0" err="1">
+                <a:solidFill>
+                  <a:schemeClr val="bg1"/>
+                </a:solidFill>
+                <a:latin typeface="Matura MT Script Capitals" panose="03020802060602070202" pitchFamily="66" charset="0"/>
+                <a:ea typeface="Meiryo" panose="020B0400000000000000" pitchFamily="34" charset="-128"/>
+                <a:cs typeface="Li Alinur Akorshon Unicode" panose="02000500000000000000" pitchFamily="2" charset="0"/>
+              </a:rPr>
+              <a:t>সন্ধ্যা</a:t>
+            </a:r>
+            <a:endParaRPr lang="en-CA" sz="3200" b="1" dirty="0">
+              <a:solidFill>
+                <a:schemeClr val="bg1"/>
+              </a:solidFill>
+              <a:latin typeface="Matura MT Script Capitals" panose="03020802060602070202" pitchFamily="66" charset="0"/>
+              <a:ea typeface="Meiryo" panose="020B0400000000000000" pitchFamily="34" charset="-128"/>
+              <a:cs typeface="Li Alinur Akorshon Unicode" panose="02000500000000000000" pitchFamily="2" charset="0"/>
+            </a:endParaRPr>
+          </a:p>
+        </p:txBody>
+      </p:sp>
+      <p:sp>
+        <p:nvSpPr>
+          <p:cNvPr id="12" name="Rectangle 11">
             <a:extLst>
               <a:ext uri="{FF2B5EF4-FFF2-40B4-BE49-F238E27FC236}">
-                <a16:creationId xmlns:a16="http://schemas.microsoft.com/office/drawing/2014/main" id="{12E9AA2F-B848-E071-4F68-B11B54D0E64B}"/>
-              </a:ext>
-            </a:extLst>
-          </p:cNvPr>
-          <p:cNvSpPr txBox="1"/>
-          <p:nvPr/>
-        </p:nvSpPr>
-        <p:spPr>
-          <a:xfrm>
-            <a:off x="-64874" y="7670198"/>
-            <a:ext cx="6987743" cy="1477328"/>
-          </a:xfrm>
-          <a:prstGeom prst="rect">
-            <a:avLst/>
-          </a:prstGeom>
-          <a:solidFill>
-            <a:srgbClr val="106A48"/>
-          </a:solidFill>
-        </p:spPr>
-        <p:txBody>
-          <a:bodyPr wrap="square">
-            <a:spAutoFit/>
-          </a:bodyPr>
-          <a:lstStyle/>
-          <a:p>
-            <a:pPr algn="ctr"/>
-            <a:r>
-              <a:rPr lang="en-CA" b="1" i="0" dirty="0">
-                <a:solidFill>
-                  <a:schemeClr val="bg1"/>
-                </a:solidFill>
-                <a:effectLst/>
-                <a:latin typeface="arial" panose="020B0604020202020204" pitchFamily="34" charset="0"/>
-              </a:rPr>
-              <a:t>OUR SPONSORS</a:t>
-            </a:r>
-          </a:p>
-          <a:p>
-            <a:pPr algn="ctr"/>
-            <a:r>
-              <a:rPr lang="en-CA" b="0" i="0" dirty="0">
-                <a:solidFill>
-                  <a:schemeClr val="bg1"/>
-                </a:solidFill>
-                <a:effectLst/>
-                <a:latin typeface="arial" panose="020B0604020202020204" pitchFamily="34" charset="0"/>
-              </a:rPr>
-              <a:t>•</a:t>
-            </a:r>
-            <a:r>
-              <a:rPr lang="en-CA" dirty="0">
-                <a:solidFill>
-                  <a:schemeClr val="bg1"/>
-                </a:solidFill>
-              </a:rPr>
-              <a:t>Asif Khan </a:t>
-            </a:r>
-            <a:r>
-              <a:rPr lang="en-CA" b="0" i="0" dirty="0">
-                <a:solidFill>
-                  <a:schemeClr val="bg1"/>
-                </a:solidFill>
-                <a:effectLst/>
-                <a:latin typeface="arial" panose="020B0604020202020204" pitchFamily="34" charset="0"/>
-              </a:rPr>
-              <a:t>•</a:t>
-            </a:r>
-            <a:r>
-              <a:rPr lang="en-CA" dirty="0">
-                <a:solidFill>
-                  <a:schemeClr val="bg1"/>
-                </a:solidFill>
-              </a:rPr>
-              <a:t>Priyanka Nandi </a:t>
-            </a:r>
-            <a:r>
-              <a:rPr lang="en-CA" b="0" i="0" dirty="0">
-                <a:solidFill>
-                  <a:schemeClr val="bg1"/>
-                </a:solidFill>
-                <a:effectLst/>
-                <a:latin typeface="arial" panose="020B0604020202020204" pitchFamily="34" charset="0"/>
-              </a:rPr>
-              <a:t>•</a:t>
-            </a:r>
-            <a:r>
-              <a:rPr lang="en-CA" dirty="0">
-                <a:solidFill>
-                  <a:schemeClr val="bg1"/>
-                </a:solidFill>
-              </a:rPr>
-              <a:t>Feroza Financial </a:t>
-            </a:r>
-            <a:r>
-              <a:rPr lang="en-CA" b="0" i="0" dirty="0">
-                <a:solidFill>
-                  <a:schemeClr val="bg1"/>
-                </a:solidFill>
-                <a:effectLst/>
-                <a:latin typeface="arial" panose="020B0604020202020204" pitchFamily="34" charset="0"/>
-              </a:rPr>
-              <a:t>•</a:t>
-            </a:r>
-            <a:r>
-              <a:rPr lang="en-CA" dirty="0">
-                <a:solidFill>
-                  <a:schemeClr val="bg1"/>
-                </a:solidFill>
-              </a:rPr>
-              <a:t>Makkah Halal Grocery </a:t>
-            </a:r>
-          </a:p>
-          <a:p>
-            <a:pPr algn="ctr"/>
-            <a:r>
-              <a:rPr lang="en-CA" b="0" i="0" dirty="0">
-                <a:solidFill>
-                  <a:schemeClr val="bg1"/>
-                </a:solidFill>
-                <a:effectLst/>
-                <a:latin typeface="arial" panose="020B0604020202020204" pitchFamily="34" charset="0"/>
-              </a:rPr>
-              <a:t>•</a:t>
-            </a:r>
-            <a:r>
-              <a:rPr lang="en-CA" dirty="0">
-                <a:solidFill>
-                  <a:schemeClr val="bg1"/>
-                </a:solidFill>
-              </a:rPr>
-              <a:t>First Choice Supermarket &amp; Halal Meat</a:t>
-            </a:r>
-            <a:r>
-              <a:rPr lang="en-CA" b="0" i="0" dirty="0">
-                <a:solidFill>
-                  <a:schemeClr val="bg1"/>
-                </a:solidFill>
-                <a:effectLst/>
-                <a:latin typeface="arial" panose="020B0604020202020204" pitchFamily="34" charset="0"/>
-              </a:rPr>
-              <a:t> •</a:t>
-            </a:r>
-            <a:r>
-              <a:rPr lang="en-CA" dirty="0">
-                <a:solidFill>
-                  <a:schemeClr val="bg1"/>
-                </a:solidFill>
-              </a:rPr>
-              <a:t>S M Auto Sales Ltd. </a:t>
-            </a:r>
-          </a:p>
-          <a:p>
-            <a:pPr algn="ctr"/>
-            <a:r>
-              <a:rPr lang="en-CA" b="0" i="0" dirty="0">
-                <a:solidFill>
-                  <a:schemeClr val="bg1"/>
-                </a:solidFill>
-                <a:effectLst/>
-                <a:latin typeface="arial" panose="020B0604020202020204" pitchFamily="34" charset="0"/>
-              </a:rPr>
-              <a:t>•</a:t>
-            </a:r>
-            <a:r>
-              <a:rPr lang="en-CA" dirty="0">
-                <a:solidFill>
-                  <a:schemeClr val="bg1"/>
-                </a:solidFill>
-              </a:rPr>
-              <a:t>Guide Me Immigration </a:t>
-            </a:r>
-            <a:r>
-              <a:rPr lang="en-CA" b="0" i="0" dirty="0">
-                <a:solidFill>
-                  <a:schemeClr val="bg1"/>
-                </a:solidFill>
-                <a:effectLst/>
-                <a:latin typeface="arial" panose="020B0604020202020204" pitchFamily="34" charset="0"/>
-              </a:rPr>
-              <a:t>•</a:t>
-            </a:r>
-            <a:r>
-              <a:rPr lang="en-CA" dirty="0">
-                <a:solidFill>
-                  <a:schemeClr val="bg1"/>
-                </a:solidFill>
-              </a:rPr>
-              <a:t>Popular Auto </a:t>
-            </a:r>
-            <a:r>
-              <a:rPr lang="en-CA" b="0" i="0" dirty="0">
-                <a:solidFill>
-                  <a:schemeClr val="bg1"/>
-                </a:solidFill>
-                <a:effectLst/>
-                <a:latin typeface="arial" panose="020B0604020202020204" pitchFamily="34" charset="0"/>
-              </a:rPr>
-              <a:t>•</a:t>
-            </a:r>
-            <a:r>
-              <a:rPr lang="en-CA" dirty="0">
-                <a:solidFill>
-                  <a:schemeClr val="bg1"/>
-                </a:solidFill>
-              </a:rPr>
-              <a:t>Sky Motors </a:t>
-            </a:r>
-          </a:p>
-          <a:p>
-            <a:pPr algn="ctr"/>
-            <a:r>
-              <a:rPr lang="en-CA" b="0" i="0" dirty="0">
-                <a:solidFill>
-                  <a:schemeClr val="bg1"/>
-                </a:solidFill>
-                <a:effectLst/>
-                <a:latin typeface="arial" panose="020B0604020202020204" pitchFamily="34" charset="0"/>
-              </a:rPr>
-              <a:t>•</a:t>
-            </a:r>
-            <a:r>
-              <a:rPr lang="en-CA" dirty="0">
-                <a:solidFill>
-                  <a:schemeClr val="bg1"/>
-                </a:solidFill>
-              </a:rPr>
-              <a:t>Economy Auto Repair </a:t>
-            </a:r>
-            <a:r>
-              <a:rPr lang="en-CA" b="0" i="0" dirty="0">
-                <a:solidFill>
-                  <a:schemeClr val="bg1"/>
-                </a:solidFill>
-                <a:effectLst/>
-                <a:latin typeface="arial" panose="020B0604020202020204" pitchFamily="34" charset="0"/>
-              </a:rPr>
-              <a:t>•</a:t>
-            </a:r>
-            <a:r>
-              <a:rPr lang="en-CA" dirty="0">
-                <a:solidFill>
-                  <a:schemeClr val="bg1"/>
-                </a:solidFill>
-              </a:rPr>
-              <a:t>Nas-Motive Auto Sales &amp; Services</a:t>
-            </a:r>
-          </a:p>
-        </p:txBody>
-      </p:sp>
-      <p:sp>
-        <p:nvSpPr>
-          <p:cNvPr id="12" name="Rectangle 11">
-            <a:extLst>
-              <a:ext uri="{FF2B5EF4-FFF2-40B4-BE49-F238E27FC236}">
-                <a16:creationId xmlns:a16="http://schemas.microsoft.com/office/drawing/2014/main" id="{C65A9F8E-0AEA-FDFE-A45F-7B0FF32BE580}"/>
+                <a16:creationId xmlns:a16="http://schemas.microsoft.com/office/drawing/2014/main" id="{03D0D3AB-555D-F9FC-A4D4-C9236A7537E5}"/>
               </a:ext>
             </a:extLst>
           </p:cNvPr>
@@ -6261,8 +8547,8 @@
         </p:nvSpPr>
         <p:spPr>
           <a:xfrm>
-            <a:off x="21549" y="4468076"/>
-            <a:ext cx="2982701" cy="914400"/>
+            <a:off x="945842" y="5411209"/>
+            <a:ext cx="1882036" cy="419601"/>
           </a:xfrm>
           <a:prstGeom prst="rect">
             <a:avLst/>
@@ -6271,9 +8557,7 @@
             <a:srgbClr val="FF0000"/>
           </a:solidFill>
           <a:ln>
-            <a:solidFill>
-              <a:srgbClr val="106A48"/>
-            </a:solidFill>
+            <a:noFill/>
           </a:ln>
         </p:spPr>
         <p:style>
@@ -6296,9 +8580,8 @@
           <a:bodyPr rtlCol="0" anchor="ctr"/>
           <a:lstStyle/>
           <a:p>
-            <a:pPr algn="ctr"/>
-            <a:r>
-              <a:rPr lang="en-CA" sz="6000" dirty="0" err="1">
+            <a:r>
+              <a:rPr lang="en-CA" sz="2800" dirty="0" err="1">
                 <a:solidFill>
                   <a:schemeClr val="bg1"/>
                 </a:solidFill>
@@ -6306,260 +8589,45 @@
                 <a:ea typeface="Meiryo" panose="020B0400000000000000" pitchFamily="34" charset="-128"/>
                 <a:cs typeface="Li Alinur Akorshon Unicode" panose="02000500000000000000" pitchFamily="2" charset="0"/>
               </a:rPr>
-              <a:t>দিবস</a:t>
-            </a:r>
-            <a:r>
-              <a:rPr lang="en-CA" sz="6000" dirty="0">
-                <a:solidFill>
-                  <a:schemeClr val="bg1"/>
-                </a:solidFill>
-                <a:latin typeface="Matura MT Script Capitals" panose="03020802060602070202" pitchFamily="66" charset="0"/>
-                <a:ea typeface="Meiryo" panose="020B0400000000000000" pitchFamily="34" charset="-128"/>
-                <a:cs typeface="Li Alinur Akorshon Unicode" panose="02000500000000000000" pitchFamily="2" charset="0"/>
-              </a:rPr>
-              <a:t> </a:t>
-            </a:r>
-          </a:p>
-        </p:txBody>
-      </p:sp>
-    </p:spTree>
-    <p:extLst>
-      <p:ext uri="{BB962C8B-B14F-4D97-AF65-F5344CB8AC3E}">
-        <p14:creationId xmlns:p14="http://schemas.microsoft.com/office/powerpoint/2010/main" val="3651182416"/>
-      </p:ext>
-    </p:extLst>
-  </p:cSld>
-  <p:clrMapOvr>
-    <a:masterClrMapping/>
-  </p:clrMapOvr>
-</p:sld>
-</file>
-
-<file path=ppt/slides/slide6.xml><?xml version="1.0" encoding="utf-8"?>
-<p:sld xmlns:a="http://schemas.openxmlformats.org/drawingml/2006/main" xmlns:r="http://schemas.openxmlformats.org/officeDocument/2006/relationships" xmlns:p="http://schemas.openxmlformats.org/presentationml/2006/main">
-  <p:cSld>
-    <p:spTree>
-      <p:nvGrpSpPr>
-        <p:cNvPr id="1" name=""/>
-        <p:cNvGrpSpPr/>
-        <p:nvPr/>
-      </p:nvGrpSpPr>
-      <p:grpSpPr>
-        <a:xfrm>
-          <a:off x="0" y="0"/>
-          <a:ext cx="0" cy="0"/>
-          <a:chOff x="0" y="0"/>
-          <a:chExt cx="0" cy="0"/>
-        </a:xfrm>
-      </p:grpSpPr>
-      <p:pic>
-        <p:nvPicPr>
-          <p:cNvPr id="5122" name="Picture 2" descr="Calendar icon - Free download on Iconfinder">
+              <a:t>অংশগ্রহণেঃ</a:t>
+            </a:r>
+            <a:endParaRPr lang="en-CA" sz="2800" dirty="0">
+              <a:solidFill>
+                <a:schemeClr val="bg1"/>
+              </a:solidFill>
+              <a:latin typeface="Matura MT Script Capitals" panose="03020802060602070202" pitchFamily="66" charset="0"/>
+              <a:ea typeface="Meiryo" panose="020B0400000000000000" pitchFamily="34" charset="-128"/>
+              <a:cs typeface="Li Alinur Akorshon Unicode" panose="02000500000000000000" pitchFamily="2" charset="0"/>
+            </a:endParaRPr>
+          </a:p>
+        </p:txBody>
+      </p:sp>
+      <p:sp>
+        <p:nvSpPr>
+          <p:cNvPr id="13" name="Rectangle 12">
             <a:extLst>
               <a:ext uri="{FF2B5EF4-FFF2-40B4-BE49-F238E27FC236}">
-                <a16:creationId xmlns:a16="http://schemas.microsoft.com/office/drawing/2014/main" id="{E18E59D5-D8E7-577B-5EB8-23E32B895FF0}"/>
+                <a16:creationId xmlns:a16="http://schemas.microsoft.com/office/drawing/2014/main" id="{0CB8CA18-4166-ECAC-619B-ACF001FE9CCC}"/>
               </a:ext>
             </a:extLst>
           </p:cNvPr>
-          <p:cNvPicPr>
-            <a:picLocks noChangeAspect="1" noChangeArrowheads="1"/>
-          </p:cNvPicPr>
+          <p:cNvSpPr/>
           <p:nvPr/>
-        </p:nvPicPr>
-        <p:blipFill>
-          <a:blip r:embed="rId2">
-            <a:extLst>
-              <a:ext uri="{28A0092B-C50C-407E-A947-70E740481C1C}">
-                <a14:useLocalDpi xmlns:a14="http://schemas.microsoft.com/office/drawing/2010/main" val="0"/>
-              </a:ext>
-            </a:extLst>
-          </a:blip>
-          <a:srcRect/>
-          <a:stretch>
-            <a:fillRect/>
-          </a:stretch>
-        </p:blipFill>
-        <p:spPr bwMode="auto">
+        </p:nvSpPr>
+        <p:spPr>
           <a:xfrm>
-            <a:off x="251790" y="1076738"/>
-            <a:ext cx="1578113" cy="1578113"/>
+            <a:off x="944380" y="5851894"/>
+            <a:ext cx="6115987" cy="409628"/>
           </a:xfrm>
           <a:prstGeom prst="rect">
             <a:avLst/>
           </a:prstGeom>
-          <a:noFill/>
-          <a:extLst>
-            <a:ext uri="{909E8E84-426E-40DD-AFC4-6F175D3DCCD1}">
-              <a14:hiddenFill xmlns:a14="http://schemas.microsoft.com/office/drawing/2010/main">
-                <a:solidFill>
-                  <a:srgbClr val="FFFFFF"/>
-                </a:solidFill>
-              </a14:hiddenFill>
-            </a:ext>
-          </a:extLst>
-        </p:spPr>
-      </p:pic>
-      <p:pic>
-        <p:nvPicPr>
-          <p:cNvPr id="4" name="Picture 2" descr="Time Clock icon sign design 9341969 PNG">
-            <a:extLst>
-              <a:ext uri="{FF2B5EF4-FFF2-40B4-BE49-F238E27FC236}">
-                <a16:creationId xmlns:a16="http://schemas.microsoft.com/office/drawing/2014/main" id="{18365E58-0600-1096-0546-69039E64D0D7}"/>
-              </a:ext>
-            </a:extLst>
-          </p:cNvPr>
-          <p:cNvPicPr>
-            <a:picLocks noChangeAspect="1" noChangeArrowheads="1"/>
-          </p:cNvPicPr>
-          <p:nvPr/>
-        </p:nvPicPr>
-        <p:blipFill>
-          <a:blip r:embed="rId3">
-            <a:extLst>
-              <a:ext uri="{28A0092B-C50C-407E-A947-70E740481C1C}">
-                <a14:useLocalDpi xmlns:a14="http://schemas.microsoft.com/office/drawing/2010/main" val="0"/>
-              </a:ext>
-            </a:extLst>
-          </a:blip>
-          <a:srcRect/>
-          <a:stretch>
-            <a:fillRect/>
-          </a:stretch>
-        </p:blipFill>
-        <p:spPr bwMode="auto">
-          <a:xfrm>
-            <a:off x="332408" y="2835964"/>
-            <a:ext cx="1854706" cy="1895062"/>
-          </a:xfrm>
-          <a:prstGeom prst="rect">
-            <a:avLst/>
-          </a:prstGeom>
-          <a:noFill/>
-          <a:extLst>
-            <a:ext uri="{909E8E84-426E-40DD-AFC4-6F175D3DCCD1}">
-              <a14:hiddenFill xmlns:a14="http://schemas.microsoft.com/office/drawing/2010/main">
-                <a:solidFill>
-                  <a:srgbClr val="FFFFFF"/>
-                </a:solidFill>
-              </a14:hiddenFill>
-            </a:ext>
-          </a:extLst>
-        </p:spPr>
-      </p:pic>
-      <p:pic>
-        <p:nvPicPr>
-          <p:cNvPr id="5" name="Picture 8" descr="Location - Free maps and location icons">
-            <a:extLst>
-              <a:ext uri="{FF2B5EF4-FFF2-40B4-BE49-F238E27FC236}">
-                <a16:creationId xmlns:a16="http://schemas.microsoft.com/office/drawing/2014/main" id="{BF89A4D8-ED95-2C11-CAA1-B4C8AF20FC77}"/>
-              </a:ext>
-            </a:extLst>
-          </p:cNvPr>
-          <p:cNvPicPr>
-            <a:picLocks noChangeAspect="1" noChangeArrowheads="1"/>
-          </p:cNvPicPr>
-          <p:nvPr/>
-        </p:nvPicPr>
-        <p:blipFill>
-          <a:blip r:embed="rId4">
-            <a:extLst>
-              <a:ext uri="{28A0092B-C50C-407E-A947-70E740481C1C}">
-                <a14:useLocalDpi xmlns:a14="http://schemas.microsoft.com/office/drawing/2010/main" val="0"/>
-              </a:ext>
-            </a:extLst>
-          </a:blip>
-          <a:srcRect/>
-          <a:stretch>
-            <a:fillRect/>
-          </a:stretch>
-        </p:blipFill>
-        <p:spPr bwMode="auto">
-          <a:xfrm>
-            <a:off x="1829903" y="5800037"/>
-            <a:ext cx="2267225" cy="2267225"/>
-          </a:xfrm>
-          <a:prstGeom prst="rect">
-            <a:avLst/>
-          </a:prstGeom>
-          <a:noFill/>
-          <a:extLst>
-            <a:ext uri="{909E8E84-426E-40DD-AFC4-6F175D3DCCD1}">
-              <a14:hiddenFill xmlns:a14="http://schemas.microsoft.com/office/drawing/2010/main">
-                <a:solidFill>
-                  <a:srgbClr val="FFFFFF"/>
-                </a:solidFill>
-              </a14:hiddenFill>
-            </a:ext>
-          </a:extLst>
-        </p:spPr>
-      </p:pic>
-      <p:pic>
-        <p:nvPicPr>
-          <p:cNvPr id="5124" name="Picture 4" descr="14,357 Address Icons - Free in SVG, PNG, ICO - IconScout">
-            <a:extLst>
-              <a:ext uri="{FF2B5EF4-FFF2-40B4-BE49-F238E27FC236}">
-                <a16:creationId xmlns:a16="http://schemas.microsoft.com/office/drawing/2014/main" id="{8013BB89-5498-B8FB-3AC0-C5336E606A39}"/>
-              </a:ext>
-            </a:extLst>
-          </p:cNvPr>
-          <p:cNvPicPr>
-            <a:picLocks noChangeAspect="1" noChangeArrowheads="1"/>
-          </p:cNvPicPr>
-          <p:nvPr/>
-        </p:nvPicPr>
-        <p:blipFill>
-          <a:blip r:embed="rId5">
-            <a:extLst>
-              <a:ext uri="{28A0092B-C50C-407E-A947-70E740481C1C}">
-                <a14:useLocalDpi xmlns:a14="http://schemas.microsoft.com/office/drawing/2010/main" val="0"/>
-              </a:ext>
-            </a:extLst>
-          </a:blip>
-          <a:srcRect/>
-          <a:stretch>
-            <a:fillRect/>
-          </a:stretch>
-        </p:blipFill>
-        <p:spPr bwMode="auto">
-          <a:xfrm>
-            <a:off x="2810565" y="2835964"/>
-            <a:ext cx="3251200" cy="3251200"/>
-          </a:xfrm>
-          <a:prstGeom prst="rect">
-            <a:avLst/>
-          </a:prstGeom>
-          <a:noFill/>
-          <a:extLst>
-            <a:ext uri="{909E8E84-426E-40DD-AFC4-6F175D3DCCD1}">
-              <a14:hiddenFill xmlns:a14="http://schemas.microsoft.com/office/drawing/2010/main">
-                <a:solidFill>
-                  <a:srgbClr val="FFFFFF"/>
-                </a:solidFill>
-              </a14:hiddenFill>
-            </a:ext>
-          </a:extLst>
-        </p:spPr>
-      </p:pic>
-      <p:sp>
-        <p:nvSpPr>
-          <p:cNvPr id="2" name="Rectangle: Rounded Corners 1">
-            <a:extLst>
-              <a:ext uri="{FF2B5EF4-FFF2-40B4-BE49-F238E27FC236}">
-                <a16:creationId xmlns:a16="http://schemas.microsoft.com/office/drawing/2014/main" id="{C46315C8-BAF1-5B47-3E84-6BEFCE336126}"/>
-              </a:ext>
-            </a:extLst>
-          </p:cNvPr>
-          <p:cNvSpPr/>
-          <p:nvPr/>
-        </p:nvSpPr>
-        <p:spPr>
-          <a:xfrm>
-            <a:off x="2187114" y="1498600"/>
-            <a:ext cx="4297680" cy="914400"/>
-          </a:xfrm>
-          <a:prstGeom prst="roundRect">
-            <a:avLst/>
-          </a:prstGeom>
+          <a:solidFill>
+            <a:srgbClr val="106A48"/>
+          </a:solidFill>
+          <a:ln>
+            <a:noFill/>
+          </a:ln>
         </p:spPr>
         <p:style>
           <a:lnRef idx="2">
@@ -6581,26 +8649,173 @@
           <a:bodyPr rtlCol="0" anchor="ctr"/>
           <a:lstStyle/>
           <a:p>
+            <a:r>
+              <a:rPr lang="en-CA" sz="2400" dirty="0">
+                <a:solidFill>
+                  <a:schemeClr val="bg1"/>
+                </a:solidFill>
+                <a:latin typeface="Segoe UI Black" panose="020B0A02040204020203" pitchFamily="34" charset="0"/>
+                <a:ea typeface="Segoe UI Black" panose="020B0A02040204020203" pitchFamily="34" charset="0"/>
+                <a:cs typeface="Li Alinur Akorshon Unicode" panose="02000500000000000000" pitchFamily="2" charset="0"/>
+              </a:rPr>
+              <a:t>Bangla School, </a:t>
+            </a:r>
+            <a:r>
+              <a:rPr lang="en-CA" sz="2400" dirty="0" err="1">
+                <a:solidFill>
+                  <a:schemeClr val="bg1"/>
+                </a:solidFill>
+                <a:latin typeface="Segoe UI Black" panose="020B0A02040204020203" pitchFamily="34" charset="0"/>
+                <a:ea typeface="Segoe UI Black" panose="020B0A02040204020203" pitchFamily="34" charset="0"/>
+                <a:cs typeface="Li Alinur Akorshon Unicode" panose="02000500000000000000" pitchFamily="2" charset="0"/>
+              </a:rPr>
+              <a:t>BSAUS,Local</a:t>
+            </a:r>
+            <a:r>
+              <a:rPr lang="en-CA" sz="2400" dirty="0">
+                <a:solidFill>
+                  <a:schemeClr val="bg1"/>
+                </a:solidFill>
+                <a:latin typeface="Segoe UI Black" panose="020B0A02040204020203" pitchFamily="34" charset="0"/>
+                <a:ea typeface="Segoe UI Black" panose="020B0A02040204020203" pitchFamily="34" charset="0"/>
+                <a:cs typeface="Li Alinur Akorshon Unicode" panose="02000500000000000000" pitchFamily="2" charset="0"/>
+              </a:rPr>
+              <a:t> Artist</a:t>
+            </a:r>
+          </a:p>
+        </p:txBody>
+      </p:sp>
+      <p:sp>
+        <p:nvSpPr>
+          <p:cNvPr id="2" name="Rectangle 1">
+            <a:extLst>
+              <a:ext uri="{FF2B5EF4-FFF2-40B4-BE49-F238E27FC236}">
+                <a16:creationId xmlns:a16="http://schemas.microsoft.com/office/drawing/2014/main" id="{A136A952-757F-7521-CDAE-399BE31E2EC5}"/>
+              </a:ext>
+            </a:extLst>
+          </p:cNvPr>
+          <p:cNvSpPr/>
+          <p:nvPr/>
+        </p:nvSpPr>
+        <p:spPr>
+          <a:xfrm>
+            <a:off x="-185431" y="-12453"/>
+            <a:ext cx="7245798" cy="1068138"/>
+          </a:xfrm>
+          <a:prstGeom prst="rect">
+            <a:avLst/>
+          </a:prstGeom>
+          <a:solidFill>
+            <a:srgbClr val="106A48">
+              <a:alpha val="21000"/>
+            </a:srgbClr>
+          </a:solidFill>
+          <a:ln>
+            <a:noFill/>
+          </a:ln>
+        </p:spPr>
+        <p:style>
+          <a:lnRef idx="2">
+            <a:schemeClr val="accent1">
+              <a:shade val="15000"/>
+            </a:schemeClr>
+          </a:lnRef>
+          <a:fillRef idx="1">
+            <a:schemeClr val="accent1"/>
+          </a:fillRef>
+          <a:effectRef idx="0">
+            <a:schemeClr val="accent1"/>
+          </a:effectRef>
+          <a:fontRef idx="minor">
+            <a:schemeClr val="lt1"/>
+          </a:fontRef>
+        </p:style>
+        <p:txBody>
+          <a:bodyPr rtlCol="0" anchor="ctr"/>
+          <a:lstStyle/>
+          <a:p>
             <a:pPr algn="ctr"/>
             <a:r>
-              <a:rPr lang="en-US" dirty="0"/>
-              <a:t>Venue:  Mayfair United Church902 33rd St W, Saskatoon, SK S7L 0W6</a:t>
+              <a:rPr lang="en-US" dirty="0">
+                <a:solidFill>
+                  <a:schemeClr val="tx1"/>
+                </a:solidFill>
+                <a:latin typeface="Times" pitchFamily="2" charset="0"/>
+                <a:ea typeface="Noteworthy Light" panose="02000400000000000000" pitchFamily="2" charset="77"/>
+                <a:cs typeface="Kohinoor Bangla" panose="02000000000000000000" pitchFamily="2" charset="77"/>
+              </a:rPr>
+              <a:t>Bangladeshi Community Association of Saskatchewan</a:t>
             </a:r>
           </a:p>
           <a:p>
             <a:pPr algn="ctr"/>
             <a:r>
-              <a:rPr lang="en-US" dirty="0"/>
-              <a:t>Date: Saturday Dec 16, 2023Time: 5.30pm</a:t>
-            </a:r>
-            <a:endParaRPr lang="en-CA" dirty="0"/>
-          </a:p>
-        </p:txBody>
-      </p:sp>
+              <a:rPr lang="en-US" dirty="0" err="1">
+                <a:solidFill>
+                  <a:schemeClr val="tx1"/>
+                </a:solidFill>
+                <a:latin typeface="SolaimanLipi" panose="03000600000000000000" pitchFamily="66" charset="0"/>
+                <a:ea typeface="Noteworthy Light" panose="02000400000000000000" pitchFamily="2" charset="77"/>
+                <a:cs typeface="SolaimanLipi" panose="03000600000000000000" pitchFamily="66" charset="0"/>
+              </a:rPr>
+              <a:t>বাংলাদেশী</a:t>
+            </a:r>
+            <a:r>
+              <a:rPr lang="bn-IN" dirty="0">
+                <a:solidFill>
+                  <a:schemeClr val="tx1"/>
+                </a:solidFill>
+                <a:latin typeface="SolaimanLipi" panose="03000600000000000000" pitchFamily="66" charset="0"/>
+                <a:ea typeface="Noteworthy Light" panose="02000400000000000000" pitchFamily="2" charset="77"/>
+                <a:cs typeface="SolaimanLipi" panose="03000600000000000000" pitchFamily="66" charset="0"/>
+              </a:rPr>
+              <a:t> কমিউনিটি এ্যসোসিয়েশন অব সাসকাচুয়ান</a:t>
+            </a:r>
+            <a:endParaRPr lang="en-US" dirty="0">
+              <a:solidFill>
+                <a:schemeClr val="tx1"/>
+              </a:solidFill>
+              <a:latin typeface="SolaimanLipi" panose="03000600000000000000" pitchFamily="66" charset="0"/>
+              <a:ea typeface="Noteworthy Light" panose="02000400000000000000" pitchFamily="2" charset="77"/>
+              <a:cs typeface="SolaimanLipi" panose="03000600000000000000" pitchFamily="66" charset="0"/>
+            </a:endParaRPr>
+          </a:p>
+        </p:txBody>
+      </p:sp>
+      <p:pic>
+        <p:nvPicPr>
+          <p:cNvPr id="3" name="Picture 2" descr="A flag and flowers with a yellow border&#10;&#10;Description automatically generated">
+            <a:extLst>
+              <a:ext uri="{FF2B5EF4-FFF2-40B4-BE49-F238E27FC236}">
+                <a16:creationId xmlns:a16="http://schemas.microsoft.com/office/drawing/2014/main" id="{0C63FC9A-BE97-BD70-0ED3-78EF38F4E982}"/>
+              </a:ext>
+            </a:extLst>
+          </p:cNvPr>
+          <p:cNvPicPr>
+            <a:picLocks noChangeAspect="1"/>
+          </p:cNvPicPr>
+          <p:nvPr/>
+        </p:nvPicPr>
+        <p:blipFill>
+          <a:blip r:embed="rId4"/>
+          <a:stretch>
+            <a:fillRect/>
+          </a:stretch>
+        </p:blipFill>
+        <p:spPr>
+          <a:xfrm>
+            <a:off x="345682" y="516439"/>
+            <a:ext cx="770045" cy="433930"/>
+          </a:xfrm>
+          <a:prstGeom prst="rect">
+            <a:avLst/>
+          </a:prstGeom>
+        </p:spPr>
+      </p:pic>
     </p:spTree>
     <p:extLst>
       <p:ext uri="{BB962C8B-B14F-4D97-AF65-F5344CB8AC3E}">
-        <p14:creationId xmlns:p14="http://schemas.microsoft.com/office/powerpoint/2010/main" val="4113317159"/>
+        <p14:creationId xmlns:p14="http://schemas.microsoft.com/office/powerpoint/2010/main" val="2371357412"/>
       </p:ext>
     </p:extLst>
   </p:cSld>

</xml_diff>